<commit_message>
Version sent to Toth after incorporating her feedback
</commit_message>
<xml_diff>
--- a/images/Presentation1.pptx
+++ b/images/Presentation1.pptx
@@ -4,9 +4,17 @@
   <p:sldMasterIdLst>
     <p:sldMasterId id="2147483648" r:id="rId1"/>
   </p:sldMasterIdLst>
+  <p:notesMasterIdLst>
+    <p:notesMasterId r:id="rId9"/>
+  </p:notesMasterIdLst>
   <p:sldIdLst>
     <p:sldId id="256" r:id="rId2"/>
     <p:sldId id="257" r:id="rId3"/>
+    <p:sldId id="258" r:id="rId4"/>
+    <p:sldId id="259" r:id="rId5"/>
+    <p:sldId id="260" r:id="rId6"/>
+    <p:sldId id="262" r:id="rId7"/>
+    <p:sldId id="264" r:id="rId8"/>
   </p:sldIdLst>
   <p:sldSz cx="12192000" cy="6858000"/>
   <p:notesSz cx="6858000" cy="9144000"/>
@@ -108,6 +116,356 @@
 </p:presentation>
 </file>
 
+<file path=ppt/notesMasters/notesMaster1.xml><?xml version="1.0" encoding="utf-8"?>
+<p:notesMaster xmlns:a="http://schemas.openxmlformats.org/drawingml/2006/main" xmlns:r="http://schemas.openxmlformats.org/officeDocument/2006/relationships" xmlns:p="http://schemas.openxmlformats.org/presentationml/2006/main">
+  <p:cSld>
+    <p:bg>
+      <p:bgRef idx="1001">
+        <a:schemeClr val="bg1"/>
+      </p:bgRef>
+    </p:bg>
+    <p:spTree>
+      <p:nvGrpSpPr>
+        <p:cNvPr id="1" name=""/>
+        <p:cNvGrpSpPr/>
+        <p:nvPr/>
+      </p:nvGrpSpPr>
+      <p:grpSpPr>
+        <a:xfrm>
+          <a:off x="0" y="0"/>
+          <a:ext cx="0" cy="0"/>
+          <a:chOff x="0" y="0"/>
+          <a:chExt cx="0" cy="0"/>
+        </a:xfrm>
+      </p:grpSpPr>
+      <p:sp>
+        <p:nvSpPr>
+          <p:cNvPr id="2" name="Header Placeholder 1"/>
+          <p:cNvSpPr>
+            <a:spLocks noGrp="1"/>
+          </p:cNvSpPr>
+          <p:nvPr>
+            <p:ph type="hdr" sz="quarter"/>
+          </p:nvPr>
+        </p:nvSpPr>
+        <p:spPr>
+          <a:xfrm>
+            <a:off x="0" y="0"/>
+            <a:ext cx="2971800" cy="458788"/>
+          </a:xfrm>
+          <a:prstGeom prst="rect">
+            <a:avLst/>
+          </a:prstGeom>
+        </p:spPr>
+        <p:txBody>
+          <a:bodyPr vert="horz" lIns="91440" tIns="45720" rIns="91440" bIns="45720" rtlCol="0"/>
+          <a:lstStyle>
+            <a:lvl1pPr algn="l">
+              <a:defRPr sz="1200"/>
+            </a:lvl1pPr>
+          </a:lstStyle>
+          <a:p>
+            <a:endParaRPr lang="en-US" dirty="0"/>
+          </a:p>
+        </p:txBody>
+      </p:sp>
+      <p:sp>
+        <p:nvSpPr>
+          <p:cNvPr id="3" name="Date Placeholder 2"/>
+          <p:cNvSpPr>
+            <a:spLocks noGrp="1"/>
+          </p:cNvSpPr>
+          <p:nvPr>
+            <p:ph type="dt" idx="1"/>
+          </p:nvPr>
+        </p:nvSpPr>
+        <p:spPr>
+          <a:xfrm>
+            <a:off x="3884613" y="0"/>
+            <a:ext cx="2971800" cy="458788"/>
+          </a:xfrm>
+          <a:prstGeom prst="rect">
+            <a:avLst/>
+          </a:prstGeom>
+        </p:spPr>
+        <p:txBody>
+          <a:bodyPr vert="horz" lIns="91440" tIns="45720" rIns="91440" bIns="45720" rtlCol="0"/>
+          <a:lstStyle>
+            <a:lvl1pPr algn="r">
+              <a:defRPr sz="1200"/>
+            </a:lvl1pPr>
+          </a:lstStyle>
+          <a:p>
+            <a:fld id="{85C1911F-1531-6949-9FF8-91F83056A5D7}" type="datetimeFigureOut">
+              <a:rPr lang="en-US" smtClean="0"/>
+              <a:t>4/30/18</a:t>
+            </a:fld>
+            <a:endParaRPr lang="en-US" dirty="0"/>
+          </a:p>
+        </p:txBody>
+      </p:sp>
+      <p:sp>
+        <p:nvSpPr>
+          <p:cNvPr id="4" name="Slide Image Placeholder 3"/>
+          <p:cNvSpPr>
+            <a:spLocks noGrp="1" noRot="1" noChangeAspect="1"/>
+          </p:cNvSpPr>
+          <p:nvPr>
+            <p:ph type="sldImg" idx="2"/>
+          </p:nvPr>
+        </p:nvSpPr>
+        <p:spPr>
+          <a:xfrm>
+            <a:off x="685800" y="1143000"/>
+            <a:ext cx="5486400" cy="3086100"/>
+          </a:xfrm>
+          <a:prstGeom prst="rect">
+            <a:avLst/>
+          </a:prstGeom>
+          <a:noFill/>
+          <a:ln w="12700">
+            <a:solidFill>
+              <a:prstClr val="black"/>
+            </a:solidFill>
+          </a:ln>
+        </p:spPr>
+        <p:txBody>
+          <a:bodyPr vert="horz" lIns="91440" tIns="45720" rIns="91440" bIns="45720" rtlCol="0" anchor="ctr"/>
+          <a:lstStyle/>
+          <a:p>
+            <a:endParaRPr lang="en-US" dirty="0"/>
+          </a:p>
+        </p:txBody>
+      </p:sp>
+      <p:sp>
+        <p:nvSpPr>
+          <p:cNvPr id="5" name="Notes Placeholder 4"/>
+          <p:cNvSpPr>
+            <a:spLocks noGrp="1"/>
+          </p:cNvSpPr>
+          <p:nvPr>
+            <p:ph type="body" sz="quarter" idx="3"/>
+          </p:nvPr>
+        </p:nvSpPr>
+        <p:spPr>
+          <a:xfrm>
+            <a:off x="685800" y="4400550"/>
+            <a:ext cx="5486400" cy="3600450"/>
+          </a:xfrm>
+          <a:prstGeom prst="rect">
+            <a:avLst/>
+          </a:prstGeom>
+        </p:spPr>
+        <p:txBody>
+          <a:bodyPr vert="horz" lIns="91440" tIns="45720" rIns="91440" bIns="45720" rtlCol="0"/>
+          <a:lstStyle/>
+          <a:p>
+            <a:pPr lvl="0"/>
+            <a:r>
+              <a:rPr lang="en-US" smtClean="0"/>
+              <a:t>Click to edit Master text styles</a:t>
+            </a:r>
+          </a:p>
+          <a:p>
+            <a:pPr lvl="1"/>
+            <a:r>
+              <a:rPr lang="en-US" smtClean="0"/>
+              <a:t>Second level</a:t>
+            </a:r>
+          </a:p>
+          <a:p>
+            <a:pPr lvl="2"/>
+            <a:r>
+              <a:rPr lang="en-US" smtClean="0"/>
+              <a:t>Third level</a:t>
+            </a:r>
+          </a:p>
+          <a:p>
+            <a:pPr lvl="3"/>
+            <a:r>
+              <a:rPr lang="en-US" smtClean="0"/>
+              <a:t>Fourth level</a:t>
+            </a:r>
+          </a:p>
+          <a:p>
+            <a:pPr lvl="4"/>
+            <a:r>
+              <a:rPr lang="en-US" smtClean="0"/>
+              <a:t>Fifth level</a:t>
+            </a:r>
+            <a:endParaRPr lang="en-US"/>
+          </a:p>
+        </p:txBody>
+      </p:sp>
+      <p:sp>
+        <p:nvSpPr>
+          <p:cNvPr id="6" name="Footer Placeholder 5"/>
+          <p:cNvSpPr>
+            <a:spLocks noGrp="1"/>
+          </p:cNvSpPr>
+          <p:nvPr>
+            <p:ph type="ftr" sz="quarter" idx="4"/>
+          </p:nvPr>
+        </p:nvSpPr>
+        <p:spPr>
+          <a:xfrm>
+            <a:off x="0" y="8685213"/>
+            <a:ext cx="2971800" cy="458787"/>
+          </a:xfrm>
+          <a:prstGeom prst="rect">
+            <a:avLst/>
+          </a:prstGeom>
+        </p:spPr>
+        <p:txBody>
+          <a:bodyPr vert="horz" lIns="91440" tIns="45720" rIns="91440" bIns="45720" rtlCol="0" anchor="b"/>
+          <a:lstStyle>
+            <a:lvl1pPr algn="l">
+              <a:defRPr sz="1200"/>
+            </a:lvl1pPr>
+          </a:lstStyle>
+          <a:p>
+            <a:endParaRPr lang="en-US" dirty="0"/>
+          </a:p>
+        </p:txBody>
+      </p:sp>
+      <p:sp>
+        <p:nvSpPr>
+          <p:cNvPr id="7" name="Slide Number Placeholder 6"/>
+          <p:cNvSpPr>
+            <a:spLocks noGrp="1"/>
+          </p:cNvSpPr>
+          <p:nvPr>
+            <p:ph type="sldNum" sz="quarter" idx="5"/>
+          </p:nvPr>
+        </p:nvSpPr>
+        <p:spPr>
+          <a:xfrm>
+            <a:off x="3884613" y="8685213"/>
+            <a:ext cx="2971800" cy="458787"/>
+          </a:xfrm>
+          <a:prstGeom prst="rect">
+            <a:avLst/>
+          </a:prstGeom>
+        </p:spPr>
+        <p:txBody>
+          <a:bodyPr vert="horz" lIns="91440" tIns="45720" rIns="91440" bIns="45720" rtlCol="0" anchor="b"/>
+          <a:lstStyle>
+            <a:lvl1pPr algn="r">
+              <a:defRPr sz="1200"/>
+            </a:lvl1pPr>
+          </a:lstStyle>
+          <a:p>
+            <a:fld id="{121E626C-C7B7-8D4A-AF13-0CA6301B7CAF}" type="slidenum">
+              <a:rPr lang="en-US" smtClean="0"/>
+              <a:t>‹#›</a:t>
+            </a:fld>
+            <a:endParaRPr lang="en-US" dirty="0"/>
+          </a:p>
+        </p:txBody>
+      </p:sp>
+    </p:spTree>
+    <p:extLst>
+      <p:ext uri="{BB962C8B-B14F-4D97-AF65-F5344CB8AC3E}">
+        <p14:creationId xmlns:p14="http://schemas.microsoft.com/office/powerpoint/2010/main" val="538282968"/>
+      </p:ext>
+    </p:extLst>
+  </p:cSld>
+  <p:clrMap bg1="lt1" tx1="dk1" bg2="lt2" tx2="dk2" accent1="accent1" accent2="accent2" accent3="accent3" accent4="accent4" accent5="accent5" accent6="accent6" hlink="hlink" folHlink="folHlink"/>
+  <p:notesStyle>
+    <a:lvl1pPr marL="0" algn="l" defTabSz="914400" rtl="0" eaLnBrk="1" latinLnBrk="0" hangingPunct="1">
+      <a:defRPr sz="1200" kern="1200">
+        <a:solidFill>
+          <a:schemeClr val="tx1"/>
+        </a:solidFill>
+        <a:latin typeface="+mn-lt"/>
+        <a:ea typeface="+mn-ea"/>
+        <a:cs typeface="+mn-cs"/>
+      </a:defRPr>
+    </a:lvl1pPr>
+    <a:lvl2pPr marL="457200" algn="l" defTabSz="914400" rtl="0" eaLnBrk="1" latinLnBrk="0" hangingPunct="1">
+      <a:defRPr sz="1200" kern="1200">
+        <a:solidFill>
+          <a:schemeClr val="tx1"/>
+        </a:solidFill>
+        <a:latin typeface="+mn-lt"/>
+        <a:ea typeface="+mn-ea"/>
+        <a:cs typeface="+mn-cs"/>
+      </a:defRPr>
+    </a:lvl2pPr>
+    <a:lvl3pPr marL="914400" algn="l" defTabSz="914400" rtl="0" eaLnBrk="1" latinLnBrk="0" hangingPunct="1">
+      <a:defRPr sz="1200" kern="1200">
+        <a:solidFill>
+          <a:schemeClr val="tx1"/>
+        </a:solidFill>
+        <a:latin typeface="+mn-lt"/>
+        <a:ea typeface="+mn-ea"/>
+        <a:cs typeface="+mn-cs"/>
+      </a:defRPr>
+    </a:lvl3pPr>
+    <a:lvl4pPr marL="1371600" algn="l" defTabSz="914400" rtl="0" eaLnBrk="1" latinLnBrk="0" hangingPunct="1">
+      <a:defRPr sz="1200" kern="1200">
+        <a:solidFill>
+          <a:schemeClr val="tx1"/>
+        </a:solidFill>
+        <a:latin typeface="+mn-lt"/>
+        <a:ea typeface="+mn-ea"/>
+        <a:cs typeface="+mn-cs"/>
+      </a:defRPr>
+    </a:lvl4pPr>
+    <a:lvl5pPr marL="1828800" algn="l" defTabSz="914400" rtl="0" eaLnBrk="1" latinLnBrk="0" hangingPunct="1">
+      <a:defRPr sz="1200" kern="1200">
+        <a:solidFill>
+          <a:schemeClr val="tx1"/>
+        </a:solidFill>
+        <a:latin typeface="+mn-lt"/>
+        <a:ea typeface="+mn-ea"/>
+        <a:cs typeface="+mn-cs"/>
+      </a:defRPr>
+    </a:lvl5pPr>
+    <a:lvl6pPr marL="2286000" algn="l" defTabSz="914400" rtl="0" eaLnBrk="1" latinLnBrk="0" hangingPunct="1">
+      <a:defRPr sz="1200" kern="1200">
+        <a:solidFill>
+          <a:schemeClr val="tx1"/>
+        </a:solidFill>
+        <a:latin typeface="+mn-lt"/>
+        <a:ea typeface="+mn-ea"/>
+        <a:cs typeface="+mn-cs"/>
+      </a:defRPr>
+    </a:lvl6pPr>
+    <a:lvl7pPr marL="2743200" algn="l" defTabSz="914400" rtl="0" eaLnBrk="1" latinLnBrk="0" hangingPunct="1">
+      <a:defRPr sz="1200" kern="1200">
+        <a:solidFill>
+          <a:schemeClr val="tx1"/>
+        </a:solidFill>
+        <a:latin typeface="+mn-lt"/>
+        <a:ea typeface="+mn-ea"/>
+        <a:cs typeface="+mn-cs"/>
+      </a:defRPr>
+    </a:lvl7pPr>
+    <a:lvl8pPr marL="3200400" algn="l" defTabSz="914400" rtl="0" eaLnBrk="1" latinLnBrk="0" hangingPunct="1">
+      <a:defRPr sz="1200" kern="1200">
+        <a:solidFill>
+          <a:schemeClr val="tx1"/>
+        </a:solidFill>
+        <a:latin typeface="+mn-lt"/>
+        <a:ea typeface="+mn-ea"/>
+        <a:cs typeface="+mn-cs"/>
+      </a:defRPr>
+    </a:lvl8pPr>
+    <a:lvl9pPr marL="3657600" algn="l" defTabSz="914400" rtl="0" eaLnBrk="1" latinLnBrk="0" hangingPunct="1">
+      <a:defRPr sz="1200" kern="1200">
+        <a:solidFill>
+          <a:schemeClr val="tx1"/>
+        </a:solidFill>
+        <a:latin typeface="+mn-lt"/>
+        <a:ea typeface="+mn-ea"/>
+        <a:cs typeface="+mn-cs"/>
+      </a:defRPr>
+    </a:lvl9pPr>
+  </p:notesStyle>
+</p:notesMaster>
+</file>
+
 <file path=ppt/slideLayouts/slideLayout1.xml><?xml version="1.0" encoding="utf-8"?>
 <p:sldLayout xmlns:a="http://schemas.openxmlformats.org/drawingml/2006/main" xmlns:r="http://schemas.openxmlformats.org/officeDocument/2006/relationships" xmlns:p="http://schemas.openxmlformats.org/presentationml/2006/main" type="title" preserve="1">
   <p:cSld name="Title Slide">
@@ -241,7 +599,7 @@
               <a:rPr lang="en-US" smtClean="0"/>
               <a:t>4/29/18</a:t>
             </a:fld>
-            <a:endParaRPr lang="en-US"/>
+            <a:endParaRPr lang="en-US" dirty="0"/>
           </a:p>
         </p:txBody>
       </p:sp>
@@ -260,7 +618,7 @@
           <a:bodyPr/>
           <a:lstStyle/>
           <a:p>
-            <a:endParaRPr lang="en-US"/>
+            <a:endParaRPr lang="en-US" dirty="0"/>
           </a:p>
         </p:txBody>
       </p:sp>
@@ -283,7 +641,7 @@
               <a:rPr lang="en-US" smtClean="0"/>
               <a:t>‹#›</a:t>
             </a:fld>
-            <a:endParaRPr lang="en-US"/>
+            <a:endParaRPr lang="en-US" dirty="0"/>
           </a:p>
         </p:txBody>
       </p:sp>
@@ -411,7 +769,7 @@
               <a:rPr lang="en-US" smtClean="0"/>
               <a:t>4/29/18</a:t>
             </a:fld>
-            <a:endParaRPr lang="en-US"/>
+            <a:endParaRPr lang="en-US" dirty="0"/>
           </a:p>
         </p:txBody>
       </p:sp>
@@ -430,7 +788,7 @@
           <a:bodyPr/>
           <a:lstStyle/>
           <a:p>
-            <a:endParaRPr lang="en-US"/>
+            <a:endParaRPr lang="en-US" dirty="0"/>
           </a:p>
         </p:txBody>
       </p:sp>
@@ -453,7 +811,7 @@
               <a:rPr lang="en-US" smtClean="0"/>
               <a:t>‹#›</a:t>
             </a:fld>
-            <a:endParaRPr lang="en-US"/>
+            <a:endParaRPr lang="en-US" dirty="0"/>
           </a:p>
         </p:txBody>
       </p:sp>
@@ -591,7 +949,7 @@
               <a:rPr lang="en-US" smtClean="0"/>
               <a:t>4/29/18</a:t>
             </a:fld>
-            <a:endParaRPr lang="en-US"/>
+            <a:endParaRPr lang="en-US" dirty="0"/>
           </a:p>
         </p:txBody>
       </p:sp>
@@ -610,7 +968,7 @@
           <a:bodyPr/>
           <a:lstStyle/>
           <a:p>
-            <a:endParaRPr lang="en-US"/>
+            <a:endParaRPr lang="en-US" dirty="0"/>
           </a:p>
         </p:txBody>
       </p:sp>
@@ -633,7 +991,7 @@
               <a:rPr lang="en-US" smtClean="0"/>
               <a:t>‹#›</a:t>
             </a:fld>
-            <a:endParaRPr lang="en-US"/>
+            <a:endParaRPr lang="en-US" dirty="0"/>
           </a:p>
         </p:txBody>
       </p:sp>
@@ -761,7 +1119,7 @@
               <a:rPr lang="en-US" smtClean="0"/>
               <a:t>4/29/18</a:t>
             </a:fld>
-            <a:endParaRPr lang="en-US"/>
+            <a:endParaRPr lang="en-US" dirty="0"/>
           </a:p>
         </p:txBody>
       </p:sp>
@@ -780,7 +1138,7 @@
           <a:bodyPr/>
           <a:lstStyle/>
           <a:p>
-            <a:endParaRPr lang="en-US"/>
+            <a:endParaRPr lang="en-US" dirty="0"/>
           </a:p>
         </p:txBody>
       </p:sp>
@@ -803,7 +1161,7 @@
               <a:rPr lang="en-US" smtClean="0"/>
               <a:t>‹#›</a:t>
             </a:fld>
-            <a:endParaRPr lang="en-US"/>
+            <a:endParaRPr lang="en-US" dirty="0"/>
           </a:p>
         </p:txBody>
       </p:sp>
@@ -1007,7 +1365,7 @@
               <a:rPr lang="en-US" smtClean="0"/>
               <a:t>4/29/18</a:t>
             </a:fld>
-            <a:endParaRPr lang="en-US"/>
+            <a:endParaRPr lang="en-US" dirty="0"/>
           </a:p>
         </p:txBody>
       </p:sp>
@@ -1026,7 +1384,7 @@
           <a:bodyPr/>
           <a:lstStyle/>
           <a:p>
-            <a:endParaRPr lang="en-US"/>
+            <a:endParaRPr lang="en-US" dirty="0"/>
           </a:p>
         </p:txBody>
       </p:sp>
@@ -1049,7 +1407,7 @@
               <a:rPr lang="en-US" smtClean="0"/>
               <a:t>‹#›</a:t>
             </a:fld>
-            <a:endParaRPr lang="en-US"/>
+            <a:endParaRPr lang="en-US" dirty="0"/>
           </a:p>
         </p:txBody>
       </p:sp>
@@ -1239,7 +1597,7 @@
               <a:rPr lang="en-US" smtClean="0"/>
               <a:t>4/29/18</a:t>
             </a:fld>
-            <a:endParaRPr lang="en-US"/>
+            <a:endParaRPr lang="en-US" dirty="0"/>
           </a:p>
         </p:txBody>
       </p:sp>
@@ -1258,7 +1616,7 @@
           <a:bodyPr/>
           <a:lstStyle/>
           <a:p>
-            <a:endParaRPr lang="en-US"/>
+            <a:endParaRPr lang="en-US" dirty="0"/>
           </a:p>
         </p:txBody>
       </p:sp>
@@ -1281,7 +1639,7 @@
               <a:rPr lang="en-US" smtClean="0"/>
               <a:t>‹#›</a:t>
             </a:fld>
-            <a:endParaRPr lang="en-US"/>
+            <a:endParaRPr lang="en-US" dirty="0"/>
           </a:p>
         </p:txBody>
       </p:sp>
@@ -1606,7 +1964,7 @@
               <a:rPr lang="en-US" smtClean="0"/>
               <a:t>4/29/18</a:t>
             </a:fld>
-            <a:endParaRPr lang="en-US"/>
+            <a:endParaRPr lang="en-US" dirty="0"/>
           </a:p>
         </p:txBody>
       </p:sp>
@@ -1625,7 +1983,7 @@
           <a:bodyPr/>
           <a:lstStyle/>
           <a:p>
-            <a:endParaRPr lang="en-US"/>
+            <a:endParaRPr lang="en-US" dirty="0"/>
           </a:p>
         </p:txBody>
       </p:sp>
@@ -1648,7 +2006,7 @@
               <a:rPr lang="en-US" smtClean="0"/>
               <a:t>‹#›</a:t>
             </a:fld>
-            <a:endParaRPr lang="en-US"/>
+            <a:endParaRPr lang="en-US" dirty="0"/>
           </a:p>
         </p:txBody>
       </p:sp>
@@ -1724,7 +2082,7 @@
               <a:rPr lang="en-US" smtClean="0"/>
               <a:t>4/29/18</a:t>
             </a:fld>
-            <a:endParaRPr lang="en-US"/>
+            <a:endParaRPr lang="en-US" dirty="0"/>
           </a:p>
         </p:txBody>
       </p:sp>
@@ -1743,7 +2101,7 @@
           <a:bodyPr/>
           <a:lstStyle/>
           <a:p>
-            <a:endParaRPr lang="en-US"/>
+            <a:endParaRPr lang="en-US" dirty="0"/>
           </a:p>
         </p:txBody>
       </p:sp>
@@ -1766,7 +2124,7 @@
               <a:rPr lang="en-US" smtClean="0"/>
               <a:t>‹#›</a:t>
             </a:fld>
-            <a:endParaRPr lang="en-US"/>
+            <a:endParaRPr lang="en-US" dirty="0"/>
           </a:p>
         </p:txBody>
       </p:sp>
@@ -1819,7 +2177,7 @@
               <a:rPr lang="en-US" smtClean="0"/>
               <a:t>4/29/18</a:t>
             </a:fld>
-            <a:endParaRPr lang="en-US"/>
+            <a:endParaRPr lang="en-US" dirty="0"/>
           </a:p>
         </p:txBody>
       </p:sp>
@@ -1838,7 +2196,7 @@
           <a:bodyPr/>
           <a:lstStyle/>
           <a:p>
-            <a:endParaRPr lang="en-US"/>
+            <a:endParaRPr lang="en-US" dirty="0"/>
           </a:p>
         </p:txBody>
       </p:sp>
@@ -1861,7 +2219,7 @@
               <a:rPr lang="en-US" smtClean="0"/>
               <a:t>‹#›</a:t>
             </a:fld>
-            <a:endParaRPr lang="en-US"/>
+            <a:endParaRPr lang="en-US" dirty="0"/>
           </a:p>
         </p:txBody>
       </p:sp>
@@ -2096,7 +2454,7 @@
               <a:rPr lang="en-US" smtClean="0"/>
               <a:t>4/29/18</a:t>
             </a:fld>
-            <a:endParaRPr lang="en-US"/>
+            <a:endParaRPr lang="en-US" dirty="0"/>
           </a:p>
         </p:txBody>
       </p:sp>
@@ -2115,7 +2473,7 @@
           <a:bodyPr/>
           <a:lstStyle/>
           <a:p>
-            <a:endParaRPr lang="en-US"/>
+            <a:endParaRPr lang="en-US" dirty="0"/>
           </a:p>
         </p:txBody>
       </p:sp>
@@ -2138,7 +2496,7 @@
               <a:rPr lang="en-US" smtClean="0"/>
               <a:t>‹#›</a:t>
             </a:fld>
-            <a:endParaRPr lang="en-US"/>
+            <a:endParaRPr lang="en-US" dirty="0"/>
           </a:p>
         </p:txBody>
       </p:sp>
@@ -2261,7 +2619,7 @@
             </a:lvl9pPr>
           </a:lstStyle>
           <a:p>
-            <a:endParaRPr lang="en-US"/>
+            <a:endParaRPr lang="en-US" dirty="0"/>
           </a:p>
         </p:txBody>
       </p:sp>
@@ -2349,7 +2707,7 @@
               <a:rPr lang="en-US" smtClean="0"/>
               <a:t>4/29/18</a:t>
             </a:fld>
-            <a:endParaRPr lang="en-US"/>
+            <a:endParaRPr lang="en-US" dirty="0"/>
           </a:p>
         </p:txBody>
       </p:sp>
@@ -2368,7 +2726,7 @@
           <a:bodyPr/>
           <a:lstStyle/>
           <a:p>
-            <a:endParaRPr lang="en-US"/>
+            <a:endParaRPr lang="en-US" dirty="0"/>
           </a:p>
         </p:txBody>
       </p:sp>
@@ -2391,7 +2749,7 @@
               <a:rPr lang="en-US" smtClean="0"/>
               <a:t>‹#›</a:t>
             </a:fld>
-            <a:endParaRPr lang="en-US"/>
+            <a:endParaRPr lang="en-US" dirty="0"/>
           </a:p>
         </p:txBody>
       </p:sp>
@@ -2562,7 +2920,7 @@
               <a:rPr lang="en-US" smtClean="0"/>
               <a:t>4/29/18</a:t>
             </a:fld>
-            <a:endParaRPr lang="en-US"/>
+            <a:endParaRPr lang="en-US" dirty="0"/>
           </a:p>
         </p:txBody>
       </p:sp>
@@ -2599,7 +2957,7 @@
             </a:lvl1pPr>
           </a:lstStyle>
           <a:p>
-            <a:endParaRPr lang="en-US"/>
+            <a:endParaRPr lang="en-US" dirty="0"/>
           </a:p>
         </p:txBody>
       </p:sp>
@@ -2640,7 +2998,7 @@
               <a:rPr lang="en-US" smtClean="0"/>
               <a:t>‹#›</a:t>
             </a:fld>
-            <a:endParaRPr lang="en-US"/>
+            <a:endParaRPr lang="en-US" dirty="0"/>
           </a:p>
         </p:txBody>
       </p:sp>
@@ -3023,7 +3381,7 @@
             <a:lstStyle/>
             <a:p>
               <a:pPr algn="ctr"/>
-              <a:endParaRPr lang="en-US"/>
+              <a:endParaRPr lang="en-US" dirty="0"/>
             </a:p>
           </p:txBody>
         </p:sp>
@@ -3071,7 +3429,7 @@
             <a:lstStyle/>
             <a:p>
               <a:pPr algn="ctr"/>
-              <a:endParaRPr lang="en-US"/>
+              <a:endParaRPr lang="en-US" dirty="0"/>
             </a:p>
           </p:txBody>
         </p:sp>
@@ -3410,6 +3768,801 @@
           <a:chExt cx="0" cy="0"/>
         </a:xfrm>
       </p:grpSpPr>
+      <p:grpSp>
+        <p:nvGrpSpPr>
+          <p:cNvPr id="11" name="Group 10"/>
+          <p:cNvGrpSpPr/>
+          <p:nvPr/>
+        </p:nvGrpSpPr>
+        <p:grpSpPr>
+          <a:xfrm>
+            <a:off x="1180548" y="0"/>
+            <a:ext cx="9797143" cy="6858000"/>
+            <a:chOff x="1180548" y="0"/>
+            <a:chExt cx="9797143" cy="6858000"/>
+          </a:xfrm>
+        </p:grpSpPr>
+        <p:pic>
+          <p:nvPicPr>
+            <p:cNvPr id="4" name="Picture 3"/>
+            <p:cNvPicPr>
+              <a:picLocks noChangeAspect="1"/>
+            </p:cNvPicPr>
+            <p:nvPr/>
+          </p:nvPicPr>
+          <p:blipFill>
+            <a:blip r:embed="rId2">
+              <a:extLst>
+                <a:ext uri="{28A0092B-C50C-407E-A947-70E740481C1C}">
+                  <a14:useLocalDpi xmlns:a14="http://schemas.microsoft.com/office/drawing/2010/main" val="0"/>
+                </a:ext>
+              </a:extLst>
+            </a:blip>
+            <a:stretch>
+              <a:fillRect/>
+            </a:stretch>
+          </p:blipFill>
+          <p:spPr>
+            <a:xfrm>
+              <a:off x="1180548" y="0"/>
+              <a:ext cx="9797143" cy="6858000"/>
+            </a:xfrm>
+            <a:prstGeom prst="rect">
+              <a:avLst/>
+            </a:prstGeom>
+          </p:spPr>
+        </p:pic>
+        <p:cxnSp>
+          <p:nvCxnSpPr>
+            <p:cNvPr id="6" name="Straight Connector 5"/>
+            <p:cNvCxnSpPr/>
+            <p:nvPr/>
+          </p:nvCxnSpPr>
+          <p:spPr>
+            <a:xfrm flipV="1">
+              <a:off x="3820402" y="56271"/>
+              <a:ext cx="20894" cy="2693343"/>
+            </a:xfrm>
+            <a:prstGeom prst="line">
+              <a:avLst/>
+            </a:prstGeom>
+            <a:ln w="25400">
+              <a:solidFill>
+                <a:srgbClr val="FF0000"/>
+              </a:solidFill>
+            </a:ln>
+          </p:spPr>
+          <p:style>
+            <a:lnRef idx="1">
+              <a:schemeClr val="accent1"/>
+            </a:lnRef>
+            <a:fillRef idx="0">
+              <a:schemeClr val="accent1"/>
+            </a:fillRef>
+            <a:effectRef idx="0">
+              <a:schemeClr val="accent1"/>
+            </a:effectRef>
+            <a:fontRef idx="minor">
+              <a:schemeClr val="tx1"/>
+            </a:fontRef>
+          </p:style>
+        </p:cxnSp>
+        <p:cxnSp>
+          <p:nvCxnSpPr>
+            <p:cNvPr id="8" name="Straight Connector 7"/>
+            <p:cNvCxnSpPr/>
+            <p:nvPr/>
+          </p:nvCxnSpPr>
+          <p:spPr>
+            <a:xfrm flipV="1">
+              <a:off x="8713614" y="56271"/>
+              <a:ext cx="20894" cy="2693343"/>
+            </a:xfrm>
+            <a:prstGeom prst="line">
+              <a:avLst/>
+            </a:prstGeom>
+            <a:ln w="25400">
+              <a:solidFill>
+                <a:srgbClr val="FF0000"/>
+              </a:solidFill>
+            </a:ln>
+          </p:spPr>
+          <p:style>
+            <a:lnRef idx="1">
+              <a:schemeClr val="accent1"/>
+            </a:lnRef>
+            <a:fillRef idx="0">
+              <a:schemeClr val="accent1"/>
+            </a:fillRef>
+            <a:effectRef idx="0">
+              <a:schemeClr val="accent1"/>
+            </a:effectRef>
+            <a:fontRef idx="minor">
+              <a:schemeClr val="tx1"/>
+            </a:fontRef>
+          </p:style>
+        </p:cxnSp>
+        <p:cxnSp>
+          <p:nvCxnSpPr>
+            <p:cNvPr id="9" name="Straight Connector 8"/>
+            <p:cNvCxnSpPr/>
+            <p:nvPr/>
+          </p:nvCxnSpPr>
+          <p:spPr>
+            <a:xfrm flipV="1">
+              <a:off x="3818084" y="3486677"/>
+              <a:ext cx="20894" cy="2693343"/>
+            </a:xfrm>
+            <a:prstGeom prst="line">
+              <a:avLst/>
+            </a:prstGeom>
+            <a:ln w="25400">
+              <a:solidFill>
+                <a:srgbClr val="FF0000"/>
+              </a:solidFill>
+            </a:ln>
+          </p:spPr>
+          <p:style>
+            <a:lnRef idx="1">
+              <a:schemeClr val="accent1"/>
+            </a:lnRef>
+            <a:fillRef idx="0">
+              <a:schemeClr val="accent1"/>
+            </a:fillRef>
+            <a:effectRef idx="0">
+              <a:schemeClr val="accent1"/>
+            </a:effectRef>
+            <a:fontRef idx="minor">
+              <a:schemeClr val="tx1"/>
+            </a:fontRef>
+          </p:style>
+        </p:cxnSp>
+        <p:cxnSp>
+          <p:nvCxnSpPr>
+            <p:cNvPr id="10" name="Straight Connector 9"/>
+            <p:cNvCxnSpPr/>
+            <p:nvPr/>
+          </p:nvCxnSpPr>
+          <p:spPr>
+            <a:xfrm flipV="1">
+              <a:off x="8719268" y="3486676"/>
+              <a:ext cx="20894" cy="2697480"/>
+            </a:xfrm>
+            <a:prstGeom prst="line">
+              <a:avLst/>
+            </a:prstGeom>
+            <a:ln w="25400">
+              <a:solidFill>
+                <a:srgbClr val="FF0000"/>
+              </a:solidFill>
+            </a:ln>
+          </p:spPr>
+          <p:style>
+            <a:lnRef idx="1">
+              <a:schemeClr val="accent1"/>
+            </a:lnRef>
+            <a:fillRef idx="0">
+              <a:schemeClr val="accent1"/>
+            </a:fillRef>
+            <a:effectRef idx="0">
+              <a:schemeClr val="accent1"/>
+            </a:effectRef>
+            <a:fontRef idx="minor">
+              <a:schemeClr val="tx1"/>
+            </a:fontRef>
+          </p:style>
+        </p:cxnSp>
+      </p:grpSp>
+    </p:spTree>
+    <p:extLst>
+      <p:ext uri="{BB962C8B-B14F-4D97-AF65-F5344CB8AC3E}">
+        <p14:creationId xmlns:p14="http://schemas.microsoft.com/office/powerpoint/2010/main" val="257336582"/>
+      </p:ext>
+    </p:extLst>
+  </p:cSld>
+  <p:clrMapOvr>
+    <a:masterClrMapping/>
+  </p:clrMapOvr>
+</p:sld>
+</file>
+
+<file path=ppt/slides/slide3.xml><?xml version="1.0" encoding="utf-8"?>
+<p:sld xmlns:a="http://schemas.openxmlformats.org/drawingml/2006/main" xmlns:r="http://schemas.openxmlformats.org/officeDocument/2006/relationships" xmlns:p="http://schemas.openxmlformats.org/presentationml/2006/main">
+  <p:cSld>
+    <p:spTree>
+      <p:nvGrpSpPr>
+        <p:cNvPr id="1" name=""/>
+        <p:cNvGrpSpPr/>
+        <p:nvPr/>
+      </p:nvGrpSpPr>
+      <p:grpSpPr>
+        <a:xfrm>
+          <a:off x="0" y="0"/>
+          <a:ext cx="0" cy="0"/>
+          <a:chOff x="0" y="0"/>
+          <a:chExt cx="0" cy="0"/>
+        </a:xfrm>
+      </p:grpSpPr>
+      <p:sp>
+        <p:nvSpPr>
+          <p:cNvPr id="19" name="Rectangle 18"/>
+          <p:cNvSpPr/>
+          <p:nvPr/>
+        </p:nvSpPr>
+        <p:spPr>
+          <a:xfrm>
+            <a:off x="7343181" y="393218"/>
+            <a:ext cx="3972410" cy="5965292"/>
+          </a:xfrm>
+          <a:prstGeom prst="rect">
+            <a:avLst/>
+          </a:prstGeom>
+          <a:solidFill>
+            <a:schemeClr val="accent1">
+              <a:alpha val="60000"/>
+            </a:schemeClr>
+          </a:solidFill>
+          <a:ln>
+            <a:noFill/>
+          </a:ln>
+        </p:spPr>
+        <p:style>
+          <a:lnRef idx="2">
+            <a:schemeClr val="accent1">
+              <a:shade val="50000"/>
+            </a:schemeClr>
+          </a:lnRef>
+          <a:fillRef idx="1">
+            <a:schemeClr val="accent1"/>
+          </a:fillRef>
+          <a:effectRef idx="0">
+            <a:schemeClr val="accent1"/>
+          </a:effectRef>
+          <a:fontRef idx="minor">
+            <a:schemeClr val="lt1"/>
+          </a:fontRef>
+        </p:style>
+        <p:txBody>
+          <a:bodyPr rtlCol="0" anchor="ctr"/>
+          <a:lstStyle/>
+          <a:p>
+            <a:pPr algn="ctr"/>
+            <a:endParaRPr lang="en-US" dirty="0"/>
+          </a:p>
+        </p:txBody>
+      </p:sp>
+      <p:sp>
+        <p:nvSpPr>
+          <p:cNvPr id="16" name="Rectangle 15"/>
+          <p:cNvSpPr/>
+          <p:nvPr/>
+        </p:nvSpPr>
+        <p:spPr>
+          <a:xfrm>
+            <a:off x="346460" y="3656945"/>
+            <a:ext cx="6827159" cy="745842"/>
+          </a:xfrm>
+          <a:prstGeom prst="rect">
+            <a:avLst/>
+          </a:prstGeom>
+          <a:solidFill>
+            <a:srgbClr val="FFFF00">
+              <a:alpha val="73000"/>
+            </a:srgbClr>
+          </a:solidFill>
+          <a:ln>
+            <a:noFill/>
+          </a:ln>
+        </p:spPr>
+        <p:style>
+          <a:lnRef idx="2">
+            <a:schemeClr val="accent1">
+              <a:shade val="50000"/>
+            </a:schemeClr>
+          </a:lnRef>
+          <a:fillRef idx="1">
+            <a:schemeClr val="accent1"/>
+          </a:fillRef>
+          <a:effectRef idx="0">
+            <a:schemeClr val="accent1"/>
+          </a:effectRef>
+          <a:fontRef idx="minor">
+            <a:schemeClr val="lt1"/>
+          </a:fontRef>
+        </p:style>
+        <p:txBody>
+          <a:bodyPr rtlCol="0" anchor="ctr"/>
+          <a:lstStyle/>
+          <a:p>
+            <a:pPr algn="ctr"/>
+            <a:endParaRPr lang="en-US" dirty="0"/>
+          </a:p>
+        </p:txBody>
+      </p:sp>
+      <p:sp>
+        <p:nvSpPr>
+          <p:cNvPr id="15" name="Rectangle 14"/>
+          <p:cNvSpPr/>
+          <p:nvPr/>
+        </p:nvSpPr>
+        <p:spPr>
+          <a:xfrm>
+            <a:off x="346461" y="4402787"/>
+            <a:ext cx="6827159" cy="1841104"/>
+          </a:xfrm>
+          <a:prstGeom prst="rect">
+            <a:avLst/>
+          </a:prstGeom>
+          <a:solidFill>
+            <a:srgbClr val="FFFF00">
+              <a:alpha val="34000"/>
+            </a:srgbClr>
+          </a:solidFill>
+          <a:ln>
+            <a:noFill/>
+          </a:ln>
+        </p:spPr>
+        <p:style>
+          <a:lnRef idx="2">
+            <a:schemeClr val="accent1">
+              <a:shade val="50000"/>
+            </a:schemeClr>
+          </a:lnRef>
+          <a:fillRef idx="1">
+            <a:schemeClr val="accent1"/>
+          </a:fillRef>
+          <a:effectRef idx="0">
+            <a:schemeClr val="accent1"/>
+          </a:effectRef>
+          <a:fontRef idx="minor">
+            <a:schemeClr val="lt1"/>
+          </a:fontRef>
+        </p:style>
+        <p:txBody>
+          <a:bodyPr rtlCol="0" anchor="ctr"/>
+          <a:lstStyle/>
+          <a:p>
+            <a:pPr algn="ctr"/>
+            <a:endParaRPr lang="en-US" dirty="0"/>
+          </a:p>
+        </p:txBody>
+      </p:sp>
+      <p:sp>
+        <p:nvSpPr>
+          <p:cNvPr id="13" name="Rectangle 12"/>
+          <p:cNvSpPr/>
+          <p:nvPr/>
+        </p:nvSpPr>
+        <p:spPr>
+          <a:xfrm>
+            <a:off x="346460" y="406725"/>
+            <a:ext cx="6827159" cy="2869621"/>
+          </a:xfrm>
+          <a:prstGeom prst="rect">
+            <a:avLst/>
+          </a:prstGeom>
+          <a:solidFill>
+            <a:srgbClr val="00B050">
+              <a:alpha val="14000"/>
+            </a:srgbClr>
+          </a:solidFill>
+          <a:ln>
+            <a:noFill/>
+          </a:ln>
+        </p:spPr>
+        <p:style>
+          <a:lnRef idx="2">
+            <a:schemeClr val="accent1">
+              <a:shade val="50000"/>
+            </a:schemeClr>
+          </a:lnRef>
+          <a:fillRef idx="1">
+            <a:schemeClr val="accent1"/>
+          </a:fillRef>
+          <a:effectRef idx="0">
+            <a:schemeClr val="accent1"/>
+          </a:effectRef>
+          <a:fontRef idx="minor">
+            <a:schemeClr val="lt1"/>
+          </a:fontRef>
+        </p:style>
+        <p:txBody>
+          <a:bodyPr rtlCol="0" anchor="ctr"/>
+          <a:lstStyle/>
+          <a:p>
+            <a:pPr algn="ctr"/>
+            <a:endParaRPr lang="en-US" dirty="0"/>
+          </a:p>
+        </p:txBody>
+      </p:sp>
+      <p:sp>
+        <p:nvSpPr>
+          <p:cNvPr id="14" name="Rectangle 13"/>
+          <p:cNvSpPr/>
+          <p:nvPr/>
+        </p:nvSpPr>
+        <p:spPr>
+          <a:xfrm>
+            <a:off x="346460" y="406725"/>
+            <a:ext cx="6827159" cy="731750"/>
+          </a:xfrm>
+          <a:prstGeom prst="rect">
+            <a:avLst/>
+          </a:prstGeom>
+          <a:solidFill>
+            <a:srgbClr val="00B050">
+              <a:alpha val="28000"/>
+            </a:srgbClr>
+          </a:solidFill>
+          <a:ln>
+            <a:noFill/>
+          </a:ln>
+        </p:spPr>
+        <p:style>
+          <a:lnRef idx="2">
+            <a:schemeClr val="accent1">
+              <a:shade val="50000"/>
+            </a:schemeClr>
+          </a:lnRef>
+          <a:fillRef idx="1">
+            <a:schemeClr val="accent1"/>
+          </a:fillRef>
+          <a:effectRef idx="0">
+            <a:schemeClr val="accent1"/>
+          </a:effectRef>
+          <a:fontRef idx="minor">
+            <a:schemeClr val="lt1"/>
+          </a:fontRef>
+        </p:style>
+        <p:txBody>
+          <a:bodyPr rtlCol="0" anchor="ctr"/>
+          <a:lstStyle/>
+          <a:p>
+            <a:pPr algn="ctr"/>
+            <a:endParaRPr lang="en-US" dirty="0"/>
+          </a:p>
+        </p:txBody>
+      </p:sp>
+      <p:pic>
+        <p:nvPicPr>
+          <p:cNvPr id="5" name="Picture 4"/>
+          <p:cNvPicPr>
+            <a:picLocks noChangeAspect="1"/>
+          </p:cNvPicPr>
+          <p:nvPr/>
+        </p:nvPicPr>
+        <p:blipFill>
+          <a:blip r:embed="rId2">
+            <a:extLst>
+              <a:ext uri="{28A0092B-C50C-407E-A947-70E740481C1C}">
+                <a14:useLocalDpi xmlns:a14="http://schemas.microsoft.com/office/drawing/2010/main" val="0"/>
+              </a:ext>
+            </a:extLst>
+          </a:blip>
+          <a:stretch>
+            <a:fillRect/>
+          </a:stretch>
+        </p:blipFill>
+        <p:spPr>
+          <a:xfrm>
+            <a:off x="7455732" y="521630"/>
+            <a:ext cx="3755924" cy="5722261"/>
+          </a:xfrm>
+          <a:prstGeom prst="rect">
+            <a:avLst/>
+          </a:prstGeom>
+          <a:ln>
+            <a:noFill/>
+          </a:ln>
+        </p:spPr>
+      </p:pic>
+      <p:sp>
+        <p:nvSpPr>
+          <p:cNvPr id="6" name="TextBox 5"/>
+          <p:cNvSpPr txBox="1"/>
+          <p:nvPr/>
+        </p:nvSpPr>
+        <p:spPr>
+          <a:xfrm>
+            <a:off x="346460" y="406725"/>
+            <a:ext cx="6827160" cy="646331"/>
+          </a:xfrm>
+          <a:prstGeom prst="rect">
+            <a:avLst/>
+          </a:prstGeom>
+          <a:noFill/>
+        </p:spPr>
+        <p:txBody>
+          <a:bodyPr wrap="square" rtlCol="0">
+            <a:spAutoFit/>
+          </a:bodyPr>
+          <a:lstStyle/>
+          <a:p>
+            <a:r>
+              <a:rPr lang="en-US" dirty="0"/>
+              <a:t>Wang, Z., Gerstein, M., and Snyder, M. (2009) RNA-</a:t>
+            </a:r>
+            <a:r>
+              <a:rPr lang="en-US" dirty="0"/>
+              <a:t>Seq</a:t>
+            </a:r>
+            <a:r>
+              <a:rPr lang="en-US" dirty="0"/>
+              <a:t>: A revolutionary tool for </a:t>
+            </a:r>
+            <a:r>
+              <a:rPr lang="en-US" dirty="0" smtClean="0"/>
+              <a:t>transcriptomics</a:t>
+            </a:r>
+            <a:r>
+              <a:rPr lang="en-US" dirty="0"/>
+              <a:t>. </a:t>
+            </a:r>
+            <a:r>
+              <a:rPr lang="en-US" i="1" dirty="0"/>
+              <a:t>Nature Reviews Genetics</a:t>
+            </a:r>
+            <a:r>
+              <a:rPr lang="en-US" dirty="0"/>
+              <a:t>, 10, 57–63</a:t>
+            </a:r>
+            <a:r>
+              <a:rPr lang="en-US" dirty="0" smtClean="0"/>
+              <a:t>.</a:t>
+            </a:r>
+          </a:p>
+        </p:txBody>
+      </p:sp>
+      <p:sp>
+        <p:nvSpPr>
+          <p:cNvPr id="7" name="TextBox 6"/>
+          <p:cNvSpPr txBox="1"/>
+          <p:nvPr/>
+        </p:nvSpPr>
+        <p:spPr>
+          <a:xfrm>
+            <a:off x="346460" y="1225252"/>
+            <a:ext cx="6827160" cy="2062103"/>
+          </a:xfrm>
+          <a:prstGeom prst="rect">
+            <a:avLst/>
+          </a:prstGeom>
+          <a:noFill/>
+        </p:spPr>
+        <p:txBody>
+          <a:bodyPr wrap="square" rtlCol="0">
+            <a:spAutoFit/>
+          </a:bodyPr>
+          <a:lstStyle/>
+          <a:p>
+            <a:r>
+              <a:rPr lang="en-US" sz="1600" i="1" dirty="0" smtClean="0"/>
+              <a:t>“</a:t>
+            </a:r>
+            <a:r>
+              <a:rPr lang="en-US" sz="1600" i="1" dirty="0"/>
+              <a:t>RNA-</a:t>
+            </a:r>
+            <a:r>
+              <a:rPr lang="en-US" sz="1600" i="1" dirty="0"/>
+              <a:t>Seq</a:t>
+            </a:r>
+            <a:r>
+              <a:rPr lang="en-US" sz="1600" i="1" dirty="0"/>
+              <a:t> has also been shown to be highly </a:t>
+            </a:r>
+            <a:r>
+              <a:rPr lang="en-US" sz="1600" i="1" dirty="0" smtClean="0"/>
+              <a:t>accurate”</a:t>
+            </a:r>
+          </a:p>
+          <a:p>
+            <a:endParaRPr lang="en-US" sz="1600" i="1" dirty="0" smtClean="0"/>
+          </a:p>
+          <a:p>
+            <a:r>
+              <a:rPr lang="en-US" sz="1600" i="1" dirty="0" smtClean="0"/>
+              <a:t>“</a:t>
+            </a:r>
+            <a:r>
+              <a:rPr lang="en-US" sz="1600" i="1" dirty="0"/>
+              <a:t>R</a:t>
+            </a:r>
+            <a:r>
+              <a:rPr lang="en-US" sz="1600" i="1" dirty="0" smtClean="0"/>
+              <a:t>esults </a:t>
+            </a:r>
+            <a:r>
+              <a:rPr lang="en-US" sz="1600" i="1" dirty="0"/>
+              <a:t>of RNA-</a:t>
+            </a:r>
+            <a:r>
+              <a:rPr lang="en-US" sz="1600" i="1" dirty="0"/>
+              <a:t>Seq</a:t>
+            </a:r>
+            <a:r>
+              <a:rPr lang="en-US" sz="1600" i="1" dirty="0"/>
+              <a:t> also show high levels of reproducibility, for both technical and biological </a:t>
+            </a:r>
+            <a:r>
+              <a:rPr lang="en-US" sz="1600" i="1" dirty="0" smtClean="0"/>
+              <a:t>replicates”</a:t>
+            </a:r>
+          </a:p>
+          <a:p>
+            <a:endParaRPr lang="en-US" sz="1600" i="1" dirty="0" smtClean="0"/>
+          </a:p>
+          <a:p>
+            <a:r>
+              <a:rPr lang="en-US" sz="1600" i="1" dirty="0" smtClean="0"/>
+              <a:t>“</a:t>
+            </a:r>
+            <a:r>
+              <a:rPr lang="en-US" sz="1600" i="1" dirty="0"/>
+              <a:t>One particularly powerful advantage of RNA-</a:t>
+            </a:r>
+            <a:r>
+              <a:rPr lang="en-US" sz="1600" i="1" dirty="0"/>
+              <a:t>Seq</a:t>
+            </a:r>
+            <a:r>
+              <a:rPr lang="en-US" sz="1600" i="1" dirty="0"/>
+              <a:t> is that it can capture transcriptome dynamics across different tissues or conditions without sophisticated normalization of data </a:t>
+            </a:r>
+            <a:r>
+              <a:rPr lang="en-US" sz="1600" i="1" dirty="0" smtClean="0"/>
+              <a:t>sets”</a:t>
+            </a:r>
+            <a:endParaRPr lang="en-US" sz="1600" dirty="0" smtClean="0"/>
+          </a:p>
+        </p:txBody>
+      </p:sp>
+      <p:sp>
+        <p:nvSpPr>
+          <p:cNvPr id="8" name="TextBox 7"/>
+          <p:cNvSpPr txBox="1"/>
+          <p:nvPr/>
+        </p:nvSpPr>
+        <p:spPr>
+          <a:xfrm>
+            <a:off x="346460" y="4489565"/>
+            <a:ext cx="6827159" cy="1754326"/>
+          </a:xfrm>
+          <a:prstGeom prst="rect">
+            <a:avLst/>
+          </a:prstGeom>
+          <a:noFill/>
+        </p:spPr>
+        <p:txBody>
+          <a:bodyPr wrap="square" rtlCol="0">
+            <a:spAutoFit/>
+          </a:bodyPr>
+          <a:lstStyle/>
+          <a:p>
+            <a:r>
+              <a:rPr lang="en-US" dirty="0"/>
+              <a:t>Robinson, M.D. and Oshlack, A. (2010) A scaling normalization method for differential expression analysis of RNA-</a:t>
+            </a:r>
+            <a:r>
+              <a:rPr lang="en-US" dirty="0"/>
+              <a:t>seq</a:t>
+            </a:r>
+            <a:r>
+              <a:rPr lang="en-US" dirty="0"/>
+              <a:t> data. </a:t>
+            </a:r>
+            <a:r>
+              <a:rPr lang="en-US" i="1" dirty="0"/>
+              <a:t>Genome Biology</a:t>
+            </a:r>
+            <a:r>
+              <a:rPr lang="en-US" dirty="0"/>
+              <a:t>, 11, </a:t>
+            </a:r>
+            <a:r>
+              <a:rPr lang="en-US" dirty="0" smtClean="0"/>
+              <a:t>R25.</a:t>
+            </a:r>
+            <a:endParaRPr lang="en-US" dirty="0"/>
+          </a:p>
+          <a:p>
+            <a:endParaRPr lang="en-US" dirty="0" smtClean="0"/>
+          </a:p>
+          <a:p>
+            <a:r>
+              <a:rPr lang="en-US" dirty="0" smtClean="0"/>
+              <a:t>Risso, D., Schwartz, K., Sherlock, G., </a:t>
+            </a:r>
+            <a:r>
+              <a:rPr lang="en-US" dirty="0" smtClean="0"/>
+              <a:t>Dudoit</a:t>
+            </a:r>
+            <a:r>
+              <a:rPr lang="en-US" dirty="0" smtClean="0"/>
+              <a:t>, S. (2011) GC-Content normalization for RNA-</a:t>
+            </a:r>
+            <a:r>
+              <a:rPr lang="en-US" dirty="0" smtClean="0"/>
+              <a:t>Seq</a:t>
+            </a:r>
+            <a:r>
+              <a:rPr lang="en-US" dirty="0" smtClean="0"/>
+              <a:t> data. </a:t>
+            </a:r>
+            <a:r>
+              <a:rPr lang="en-US" i="1" dirty="0" smtClean="0"/>
+              <a:t>BMC Bioinformatics</a:t>
+            </a:r>
+            <a:r>
+              <a:rPr lang="en-US" dirty="0" smtClean="0"/>
+              <a:t>, 12, 480.</a:t>
+            </a:r>
+            <a:endParaRPr lang="en-US" dirty="0" smtClean="0"/>
+          </a:p>
+        </p:txBody>
+      </p:sp>
+      <p:pic>
+        <p:nvPicPr>
+          <p:cNvPr id="12" name="Picture 11"/>
+          <p:cNvPicPr>
+            <a:picLocks noChangeAspect="1"/>
+          </p:cNvPicPr>
+          <p:nvPr/>
+        </p:nvPicPr>
+        <p:blipFill rotWithShape="1">
+          <a:blip r:embed="rId3">
+            <a:extLst>
+              <a:ext uri="{28A0092B-C50C-407E-A947-70E740481C1C}">
+                <a14:useLocalDpi xmlns:a14="http://schemas.microsoft.com/office/drawing/2010/main" val="0"/>
+              </a:ext>
+            </a:extLst>
+          </a:blip>
+          <a:srcRect l="5961" t="21405" r="6410" b="30045"/>
+          <a:stretch/>
+        </p:blipFill>
+        <p:spPr>
+          <a:xfrm>
+            <a:off x="402335" y="3753537"/>
+            <a:ext cx="2339596" cy="694944"/>
+          </a:xfrm>
+          <a:prstGeom prst="rect">
+            <a:avLst/>
+          </a:prstGeom>
+          <a:ln w="50800">
+            <a:noFill/>
+          </a:ln>
+        </p:spPr>
+      </p:pic>
+    </p:spTree>
+    <p:extLst>
+      <p:ext uri="{BB962C8B-B14F-4D97-AF65-F5344CB8AC3E}">
+        <p14:creationId xmlns:p14="http://schemas.microsoft.com/office/powerpoint/2010/main" val="1423726106"/>
+      </p:ext>
+    </p:extLst>
+  </p:cSld>
+  <p:clrMapOvr>
+    <a:masterClrMapping/>
+  </p:clrMapOvr>
+</p:sld>
+</file>
+
+<file path=ppt/slides/slide4.xml><?xml version="1.0" encoding="utf-8"?>
+<p:sld xmlns:a="http://schemas.openxmlformats.org/drawingml/2006/main" xmlns:r="http://schemas.openxmlformats.org/officeDocument/2006/relationships" xmlns:p="http://schemas.openxmlformats.org/presentationml/2006/main">
+  <p:cSld>
+    <p:spTree>
+      <p:nvGrpSpPr>
+        <p:cNvPr id="1" name=""/>
+        <p:cNvGrpSpPr/>
+        <p:nvPr/>
+      </p:nvGrpSpPr>
+      <p:grpSpPr>
+        <a:xfrm>
+          <a:off x="0" y="0"/>
+          <a:ext cx="0" cy="0"/>
+          <a:chOff x="0" y="0"/>
+          <a:chExt cx="0" cy="0"/>
+        </a:xfrm>
+      </p:grpSpPr>
       <p:pic>
         <p:nvPicPr>
           <p:cNvPr id="4" name="Picture 3"/>
@@ -3432,158 +4585,764 @@
         </p:blipFill>
         <p:spPr>
           <a:xfrm>
-            <a:off x="1180548" y="0"/>
-            <a:ext cx="9797143" cy="6858000"/>
+            <a:off x="2267261" y="1539407"/>
+            <a:ext cx="2590800" cy="3149600"/>
           </a:xfrm>
           <a:prstGeom prst="rect">
             <a:avLst/>
           </a:prstGeom>
         </p:spPr>
       </p:pic>
-      <p:cxnSp>
-        <p:nvCxnSpPr>
-          <p:cNvPr id="6" name="Straight Connector 5"/>
-          <p:cNvCxnSpPr/>
+      <p:sp>
+        <p:nvSpPr>
+          <p:cNvPr id="5" name="TextBox 4"/>
+          <p:cNvSpPr txBox="1"/>
           <p:nvPr/>
-        </p:nvCxnSpPr>
+        </p:nvSpPr>
         <p:spPr>
-          <a:xfrm flipV="1">
-            <a:off x="3820402" y="56271"/>
-            <a:ext cx="20894" cy="2693343"/>
+          <a:xfrm>
+            <a:off x="5621312" y="1761163"/>
+            <a:ext cx="5262979" cy="646331"/>
           </a:xfrm>
-          <a:prstGeom prst="line">
+          <a:prstGeom prst="rect">
             <a:avLst/>
           </a:prstGeom>
-          <a:ln w="25400">
-            <a:solidFill>
-              <a:srgbClr val="FF0000"/>
-            </a:solidFill>
-          </a:ln>
+          <a:solidFill>
+            <a:srgbClr val="00B050"/>
+          </a:solidFill>
+        </p:spPr>
+        <p:txBody>
+          <a:bodyPr wrap="none" rtlCol="0">
+            <a:spAutoFit/>
+          </a:bodyPr>
+          <a:lstStyle/>
+          <a:p>
+            <a:r>
+              <a:rPr lang="en-US" sz="3600" b="1" dirty="0" smtClean="0">
+                <a:latin typeface="Times New Roman" charset="0"/>
+                <a:ea typeface="Times New Roman" charset="0"/>
+                <a:cs typeface="Times New Roman" charset="0"/>
+              </a:rPr>
+              <a:t>Case of GC-Content Bias </a:t>
+            </a:r>
+            <a:endParaRPr lang="en-US" sz="3600" b="1" dirty="0">
+              <a:latin typeface="Times New Roman" charset="0"/>
+              <a:ea typeface="Times New Roman" charset="0"/>
+              <a:cs typeface="Times New Roman" charset="0"/>
+            </a:endParaRPr>
+          </a:p>
+        </p:txBody>
+      </p:sp>
+      <p:sp>
+        <p:nvSpPr>
+          <p:cNvPr id="6" name="TextBox 5"/>
+          <p:cNvSpPr txBox="1"/>
+          <p:nvPr/>
+        </p:nvSpPr>
+        <p:spPr>
+          <a:xfrm>
+            <a:off x="5621312" y="3615775"/>
+            <a:ext cx="5262979" cy="923330"/>
+          </a:xfrm>
+          <a:prstGeom prst="rect">
+            <a:avLst/>
+          </a:prstGeom>
+          <a:solidFill>
+            <a:srgbClr val="00B050">
+              <a:alpha val="70000"/>
+            </a:srgbClr>
+          </a:solidFill>
+        </p:spPr>
+        <p:txBody>
+          <a:bodyPr wrap="square" rtlCol="0">
+            <a:spAutoFit/>
+          </a:bodyPr>
+          <a:lstStyle/>
+          <a:p>
+            <a:r>
+              <a:rPr lang="en-US" dirty="0">
+                <a:latin typeface="Times New Roman" charset="0"/>
+                <a:ea typeface="Times New Roman" charset="0"/>
+                <a:cs typeface="Times New Roman" charset="0"/>
+              </a:rPr>
+              <a:t>Risso, D., Schwartz, K., Sherlock, G., </a:t>
+            </a:r>
+            <a:r>
+              <a:rPr lang="en-US" dirty="0">
+                <a:latin typeface="Times New Roman" charset="0"/>
+                <a:ea typeface="Times New Roman" charset="0"/>
+                <a:cs typeface="Times New Roman" charset="0"/>
+              </a:rPr>
+              <a:t>Dudoit</a:t>
+            </a:r>
+            <a:r>
+              <a:rPr lang="en-US" dirty="0">
+                <a:latin typeface="Times New Roman" charset="0"/>
+                <a:ea typeface="Times New Roman" charset="0"/>
+                <a:cs typeface="Times New Roman" charset="0"/>
+              </a:rPr>
+              <a:t>, S. (2011) GC-Content normalization for RNA-</a:t>
+            </a:r>
+            <a:r>
+              <a:rPr lang="en-US" dirty="0">
+                <a:latin typeface="Times New Roman" charset="0"/>
+                <a:ea typeface="Times New Roman" charset="0"/>
+                <a:cs typeface="Times New Roman" charset="0"/>
+              </a:rPr>
+              <a:t>Seq</a:t>
+            </a:r>
+            <a:r>
+              <a:rPr lang="en-US" dirty="0">
+                <a:latin typeface="Times New Roman" charset="0"/>
+                <a:ea typeface="Times New Roman" charset="0"/>
+                <a:cs typeface="Times New Roman" charset="0"/>
+              </a:rPr>
+              <a:t> data. </a:t>
+            </a:r>
+            <a:r>
+              <a:rPr lang="en-US" i="1" dirty="0">
+                <a:latin typeface="Times New Roman" charset="0"/>
+                <a:ea typeface="Times New Roman" charset="0"/>
+                <a:cs typeface="Times New Roman" charset="0"/>
+              </a:rPr>
+              <a:t>BMC Bioinformatics</a:t>
+            </a:r>
+            <a:r>
+              <a:rPr lang="en-US" dirty="0">
+                <a:latin typeface="Times New Roman" charset="0"/>
+                <a:ea typeface="Times New Roman" charset="0"/>
+                <a:cs typeface="Times New Roman" charset="0"/>
+              </a:rPr>
+              <a:t>, 12, 480</a:t>
+            </a:r>
+            <a:r>
+              <a:rPr lang="en-US" dirty="0" smtClean="0">
+                <a:latin typeface="Times New Roman" charset="0"/>
+                <a:ea typeface="Times New Roman" charset="0"/>
+                <a:cs typeface="Times New Roman" charset="0"/>
+              </a:rPr>
+              <a:t>.</a:t>
+            </a:r>
+            <a:endParaRPr lang="en-US" dirty="0">
+              <a:latin typeface="Times New Roman" charset="0"/>
+              <a:ea typeface="Times New Roman" charset="0"/>
+              <a:cs typeface="Times New Roman" charset="0"/>
+            </a:endParaRPr>
+          </a:p>
+        </p:txBody>
+      </p:sp>
+      <p:sp>
+        <p:nvSpPr>
+          <p:cNvPr id="8" name="Rectangle 7"/>
+          <p:cNvSpPr/>
+          <p:nvPr/>
+        </p:nvSpPr>
+        <p:spPr>
+          <a:xfrm>
+            <a:off x="2098623" y="1199213"/>
+            <a:ext cx="9114020" cy="3972394"/>
+          </a:xfrm>
+          <a:prstGeom prst="rect">
+            <a:avLst/>
+          </a:prstGeom>
+          <a:noFill/>
         </p:spPr>
         <p:style>
-          <a:lnRef idx="1">
-            <a:schemeClr val="accent1"/>
+          <a:lnRef idx="2">
+            <a:schemeClr val="accent1">
+              <a:shade val="50000"/>
+            </a:schemeClr>
           </a:lnRef>
-          <a:fillRef idx="0">
+          <a:fillRef idx="1">
             <a:schemeClr val="accent1"/>
           </a:fillRef>
           <a:effectRef idx="0">
             <a:schemeClr val="accent1"/>
           </a:effectRef>
           <a:fontRef idx="minor">
-            <a:schemeClr val="tx1"/>
+            <a:schemeClr val="lt1"/>
           </a:fontRef>
         </p:style>
-      </p:cxnSp>
-      <p:cxnSp>
-        <p:nvCxnSpPr>
-          <p:cNvPr id="8" name="Straight Connector 7"/>
-          <p:cNvCxnSpPr/>
+        <p:txBody>
+          <a:bodyPr rtlCol="0" anchor="ctr"/>
+          <a:lstStyle/>
+          <a:p>
+            <a:pPr algn="ctr"/>
+            <a:endParaRPr lang="en-US" dirty="0"/>
+          </a:p>
+        </p:txBody>
+      </p:sp>
+    </p:spTree>
+    <p:extLst>
+      <p:ext uri="{BB962C8B-B14F-4D97-AF65-F5344CB8AC3E}">
+        <p14:creationId xmlns:p14="http://schemas.microsoft.com/office/powerpoint/2010/main" val="1076716968"/>
+      </p:ext>
+    </p:extLst>
+  </p:cSld>
+  <p:clrMapOvr>
+    <a:masterClrMapping/>
+  </p:clrMapOvr>
+</p:sld>
+</file>
+
+<file path=ppt/slides/slide5.xml><?xml version="1.0" encoding="utf-8"?>
+<p:sld xmlns:a="http://schemas.openxmlformats.org/drawingml/2006/main" xmlns:r="http://schemas.openxmlformats.org/officeDocument/2006/relationships" xmlns:p="http://schemas.openxmlformats.org/presentationml/2006/main">
+  <p:cSld>
+    <p:spTree>
+      <p:nvGrpSpPr>
+        <p:cNvPr id="1" name=""/>
+        <p:cNvGrpSpPr/>
+        <p:nvPr/>
+      </p:nvGrpSpPr>
+      <p:grpSpPr>
+        <a:xfrm>
+          <a:off x="0" y="0"/>
+          <a:ext cx="0" cy="0"/>
+          <a:chOff x="0" y="0"/>
+          <a:chExt cx="0" cy="0"/>
+        </a:xfrm>
+      </p:grpSpPr>
+      <p:pic>
+        <p:nvPicPr>
+          <p:cNvPr id="4" name="Picture 3"/>
+          <p:cNvPicPr>
+            <a:picLocks noChangeAspect="1"/>
+          </p:cNvPicPr>
           <p:nvPr/>
-        </p:nvCxnSpPr>
+        </p:nvPicPr>
+        <p:blipFill>
+          <a:blip r:embed="rId2">
+            <a:extLst>
+              <a:ext uri="{28A0092B-C50C-407E-A947-70E740481C1C}">
+                <a14:useLocalDpi xmlns:a14="http://schemas.microsoft.com/office/drawing/2010/main" val="0"/>
+              </a:ext>
+            </a:extLst>
+          </a:blip>
+          <a:stretch>
+            <a:fillRect/>
+          </a:stretch>
+        </p:blipFill>
         <p:spPr>
-          <a:xfrm flipV="1">
-            <a:off x="8713614" y="56271"/>
-            <a:ext cx="20894" cy="2693343"/>
+          <a:xfrm>
+            <a:off x="2267261" y="1539407"/>
+            <a:ext cx="2590800" cy="3149600"/>
           </a:xfrm>
-          <a:prstGeom prst="line">
+          <a:prstGeom prst="rect">
             <a:avLst/>
           </a:prstGeom>
-          <a:ln w="25400">
-            <a:solidFill>
-              <a:srgbClr val="FF0000"/>
-            </a:solidFill>
-          </a:ln>
+        </p:spPr>
+      </p:pic>
+      <p:sp>
+        <p:nvSpPr>
+          <p:cNvPr id="5" name="TextBox 4"/>
+          <p:cNvSpPr txBox="1"/>
+          <p:nvPr/>
+        </p:nvSpPr>
+        <p:spPr>
+          <a:xfrm>
+            <a:off x="5621312" y="1761163"/>
+            <a:ext cx="5275803" cy="646331"/>
+          </a:xfrm>
+          <a:prstGeom prst="rect">
+            <a:avLst/>
+          </a:prstGeom>
+          <a:solidFill>
+            <a:srgbClr val="00B050"/>
+          </a:solidFill>
+        </p:spPr>
+        <p:txBody>
+          <a:bodyPr wrap="none" rtlCol="0">
+            <a:spAutoFit/>
+          </a:bodyPr>
+          <a:lstStyle/>
+          <a:p>
+            <a:r>
+              <a:rPr lang="en-US" sz="3600" b="1" dirty="0" smtClean="0">
+                <a:latin typeface="Times New Roman" charset="0"/>
+                <a:ea typeface="Times New Roman" charset="0"/>
+                <a:cs typeface="Times New Roman" charset="0"/>
+              </a:rPr>
+              <a:t>Case of Sample Switching</a:t>
+            </a:r>
+            <a:endParaRPr lang="en-US" sz="3600" b="1" dirty="0">
+              <a:latin typeface="Times New Roman" charset="0"/>
+              <a:ea typeface="Times New Roman" charset="0"/>
+              <a:cs typeface="Times New Roman" charset="0"/>
+            </a:endParaRPr>
+          </a:p>
+        </p:txBody>
+      </p:sp>
+      <p:sp>
+        <p:nvSpPr>
+          <p:cNvPr id="6" name="TextBox 5"/>
+          <p:cNvSpPr txBox="1"/>
+          <p:nvPr/>
+        </p:nvSpPr>
+        <p:spPr>
+          <a:xfrm>
+            <a:off x="5621312" y="3050886"/>
+            <a:ext cx="5262979" cy="1477328"/>
+          </a:xfrm>
+          <a:prstGeom prst="rect">
+            <a:avLst/>
+          </a:prstGeom>
+          <a:solidFill>
+            <a:srgbClr val="00B050">
+              <a:alpha val="70000"/>
+            </a:srgbClr>
+          </a:solidFill>
+        </p:spPr>
+        <p:txBody>
+          <a:bodyPr wrap="square" rtlCol="0">
+            <a:spAutoFit/>
+          </a:bodyPr>
+          <a:lstStyle/>
+          <a:p>
+            <a:r>
+              <a:rPr lang="en-US" dirty="0"/>
+              <a:t>Baggerly, K.A. and Coombes, K.R. (2009) Deriving chemosensitivity from cell lines: Forensic bioinformatics and reproducible research in high-throughput biology. </a:t>
+            </a:r>
+            <a:r>
+              <a:rPr lang="en-US" i="1" dirty="0"/>
+              <a:t>The Annals of Applied Statistics</a:t>
+            </a:r>
+            <a:r>
+              <a:rPr lang="en-US" dirty="0"/>
+              <a:t>, 3, 1309–1334. </a:t>
+            </a:r>
+          </a:p>
+        </p:txBody>
+      </p:sp>
+      <p:sp>
+        <p:nvSpPr>
+          <p:cNvPr id="8" name="Rectangle 7"/>
+          <p:cNvSpPr/>
+          <p:nvPr/>
+        </p:nvSpPr>
+        <p:spPr>
+          <a:xfrm>
+            <a:off x="2098623" y="1199213"/>
+            <a:ext cx="9114020" cy="3972394"/>
+          </a:xfrm>
+          <a:prstGeom prst="rect">
+            <a:avLst/>
+          </a:prstGeom>
+          <a:noFill/>
         </p:spPr>
         <p:style>
-          <a:lnRef idx="1">
-            <a:schemeClr val="accent1"/>
+          <a:lnRef idx="2">
+            <a:schemeClr val="accent1">
+              <a:shade val="50000"/>
+            </a:schemeClr>
           </a:lnRef>
-          <a:fillRef idx="0">
+          <a:fillRef idx="1">
             <a:schemeClr val="accent1"/>
           </a:fillRef>
           <a:effectRef idx="0">
             <a:schemeClr val="accent1"/>
           </a:effectRef>
           <a:fontRef idx="minor">
-            <a:schemeClr val="tx1"/>
+            <a:schemeClr val="lt1"/>
           </a:fontRef>
         </p:style>
-      </p:cxnSp>
-      <p:cxnSp>
-        <p:nvCxnSpPr>
-          <p:cNvPr id="9" name="Straight Connector 8"/>
-          <p:cNvCxnSpPr/>
+        <p:txBody>
+          <a:bodyPr rtlCol="0" anchor="ctr"/>
+          <a:lstStyle/>
+          <a:p>
+            <a:pPr algn="ctr"/>
+            <a:endParaRPr lang="en-US" dirty="0"/>
+          </a:p>
+        </p:txBody>
+      </p:sp>
+    </p:spTree>
+    <p:extLst>
+      <p:ext uri="{BB962C8B-B14F-4D97-AF65-F5344CB8AC3E}">
+        <p14:creationId xmlns:p14="http://schemas.microsoft.com/office/powerpoint/2010/main" val="1720722012"/>
+      </p:ext>
+    </p:extLst>
+  </p:cSld>
+  <p:clrMapOvr>
+    <a:masterClrMapping/>
+  </p:clrMapOvr>
+</p:sld>
+</file>
+
+<file path=ppt/slides/slide6.xml><?xml version="1.0" encoding="utf-8"?>
+<p:sld xmlns:a="http://schemas.openxmlformats.org/drawingml/2006/main" xmlns:r="http://schemas.openxmlformats.org/officeDocument/2006/relationships" xmlns:p="http://schemas.openxmlformats.org/presentationml/2006/main">
+  <p:cSld>
+    <p:spTree>
+      <p:nvGrpSpPr>
+        <p:cNvPr id="1" name=""/>
+        <p:cNvGrpSpPr/>
+        <p:nvPr/>
+      </p:nvGrpSpPr>
+      <p:grpSpPr>
+        <a:xfrm>
+          <a:off x="0" y="0"/>
+          <a:ext cx="0" cy="0"/>
+          <a:chOff x="0" y="0"/>
+          <a:chExt cx="0" cy="0"/>
+        </a:xfrm>
+      </p:grpSpPr>
+      <p:pic>
+        <p:nvPicPr>
+          <p:cNvPr id="4" name="Picture 3"/>
+          <p:cNvPicPr>
+            <a:picLocks noChangeAspect="1"/>
+          </p:cNvPicPr>
           <p:nvPr/>
-        </p:nvCxnSpPr>
+        </p:nvPicPr>
+        <p:blipFill>
+          <a:blip r:embed="rId2">
+            <a:extLst>
+              <a:ext uri="{28A0092B-C50C-407E-A947-70E740481C1C}">
+                <a14:useLocalDpi xmlns:a14="http://schemas.microsoft.com/office/drawing/2010/main" val="0"/>
+              </a:ext>
+            </a:extLst>
+          </a:blip>
+          <a:stretch>
+            <a:fillRect/>
+          </a:stretch>
+        </p:blipFill>
         <p:spPr>
-          <a:xfrm flipV="1">
-            <a:off x="3818084" y="3486677"/>
-            <a:ext cx="20894" cy="2693343"/>
+          <a:xfrm>
+            <a:off x="2267261" y="1539407"/>
+            <a:ext cx="2590800" cy="3149600"/>
           </a:xfrm>
-          <a:prstGeom prst="line">
+          <a:prstGeom prst="rect">
             <a:avLst/>
           </a:prstGeom>
-          <a:ln w="25400">
-            <a:solidFill>
-              <a:srgbClr val="FF0000"/>
-            </a:solidFill>
-          </a:ln>
+        </p:spPr>
+      </p:pic>
+      <p:sp>
+        <p:nvSpPr>
+          <p:cNvPr id="5" name="TextBox 4"/>
+          <p:cNvSpPr txBox="1"/>
+          <p:nvPr/>
+        </p:nvSpPr>
+        <p:spPr>
+          <a:xfrm>
+            <a:off x="5145137" y="1746172"/>
+            <a:ext cx="5780429" cy="646331"/>
+          </a:xfrm>
+          <a:prstGeom prst="rect">
+            <a:avLst/>
+          </a:prstGeom>
+          <a:solidFill>
+            <a:srgbClr val="00B050"/>
+          </a:solidFill>
+        </p:spPr>
+        <p:txBody>
+          <a:bodyPr wrap="none" rtlCol="0">
+            <a:spAutoFit/>
+          </a:bodyPr>
+          <a:lstStyle/>
+          <a:p>
+            <a:r>
+              <a:rPr lang="en-US" sz="3600" b="1" dirty="0" smtClean="0">
+                <a:latin typeface="Times New Roman" charset="0"/>
+                <a:ea typeface="Times New Roman" charset="0"/>
+                <a:cs typeface="Times New Roman" charset="0"/>
+              </a:rPr>
+              <a:t>Case of Replicate Structures</a:t>
+            </a:r>
+            <a:endParaRPr lang="en-US" sz="3600" b="1" dirty="0">
+              <a:latin typeface="Times New Roman" charset="0"/>
+              <a:ea typeface="Times New Roman" charset="0"/>
+              <a:cs typeface="Times New Roman" charset="0"/>
+            </a:endParaRPr>
+          </a:p>
+        </p:txBody>
+      </p:sp>
+      <p:sp>
+        <p:nvSpPr>
+          <p:cNvPr id="6" name="TextBox 5"/>
+          <p:cNvSpPr txBox="1"/>
+          <p:nvPr/>
+        </p:nvSpPr>
+        <p:spPr>
+          <a:xfrm>
+            <a:off x="5145136" y="3868851"/>
+            <a:ext cx="5780429" cy="646331"/>
+          </a:xfrm>
+          <a:prstGeom prst="rect">
+            <a:avLst/>
+          </a:prstGeom>
+          <a:solidFill>
+            <a:srgbClr val="00B050">
+              <a:alpha val="70000"/>
+            </a:srgbClr>
+          </a:solidFill>
+        </p:spPr>
+        <p:txBody>
+          <a:bodyPr wrap="square" rtlCol="0">
+            <a:spAutoFit/>
+          </a:bodyPr>
+          <a:lstStyle/>
+          <a:p>
+            <a:r>
+              <a:rPr lang="en-US" dirty="0"/>
+              <a:t>Moran </a:t>
+            </a:r>
+            <a:r>
+              <a:rPr lang="en-US" dirty="0"/>
+              <a:t>Lauter</a:t>
+            </a:r>
+            <a:r>
+              <a:rPr lang="en-US" dirty="0"/>
+              <a:t>, A.N. and Graham, M.A. (2016) NCBI SRA </a:t>
+            </a:r>
+            <a:r>
+              <a:rPr lang="en-US" dirty="0"/>
+              <a:t>bioproject</a:t>
+            </a:r>
+            <a:r>
+              <a:rPr lang="en-US" dirty="0"/>
+              <a:t> </a:t>
+            </a:r>
+            <a:r>
+              <a:rPr lang="en-US" dirty="0" smtClean="0"/>
+              <a:t>accession:PRJNA318409</a:t>
+            </a:r>
+            <a:endParaRPr lang="en-US" dirty="0"/>
+          </a:p>
+        </p:txBody>
+      </p:sp>
+      <p:sp>
+        <p:nvSpPr>
+          <p:cNvPr id="8" name="Rectangle 7"/>
+          <p:cNvSpPr/>
+          <p:nvPr/>
+        </p:nvSpPr>
+        <p:spPr>
+          <a:xfrm>
+            <a:off x="2098623" y="1199213"/>
+            <a:ext cx="9114020" cy="3972394"/>
+          </a:xfrm>
+          <a:prstGeom prst="rect">
+            <a:avLst/>
+          </a:prstGeom>
+          <a:noFill/>
         </p:spPr>
         <p:style>
-          <a:lnRef idx="1">
-            <a:schemeClr val="accent1"/>
+          <a:lnRef idx="2">
+            <a:schemeClr val="accent1">
+              <a:shade val="50000"/>
+            </a:schemeClr>
           </a:lnRef>
-          <a:fillRef idx="0">
+          <a:fillRef idx="1">
             <a:schemeClr val="accent1"/>
           </a:fillRef>
           <a:effectRef idx="0">
             <a:schemeClr val="accent1"/>
           </a:effectRef>
           <a:fontRef idx="minor">
-            <a:schemeClr val="tx1"/>
+            <a:schemeClr val="lt1"/>
           </a:fontRef>
         </p:style>
-      </p:cxnSp>
-      <p:cxnSp>
-        <p:nvCxnSpPr>
-          <p:cNvPr id="10" name="Straight Connector 9"/>
-          <p:cNvCxnSpPr/>
+        <p:txBody>
+          <a:bodyPr rtlCol="0" anchor="ctr"/>
+          <a:lstStyle/>
+          <a:p>
+            <a:pPr algn="ctr"/>
+            <a:endParaRPr lang="en-US" dirty="0"/>
+          </a:p>
+        </p:txBody>
+      </p:sp>
+    </p:spTree>
+    <p:extLst>
+      <p:ext uri="{BB962C8B-B14F-4D97-AF65-F5344CB8AC3E}">
+        <p14:creationId xmlns:p14="http://schemas.microsoft.com/office/powerpoint/2010/main" val="1056212792"/>
+      </p:ext>
+    </p:extLst>
+  </p:cSld>
+  <p:clrMapOvr>
+    <a:masterClrMapping/>
+  </p:clrMapOvr>
+</p:sld>
+</file>
+
+<file path=ppt/slides/slide7.xml><?xml version="1.0" encoding="utf-8"?>
+<p:sld xmlns:a="http://schemas.openxmlformats.org/drawingml/2006/main" xmlns:r="http://schemas.openxmlformats.org/officeDocument/2006/relationships" xmlns:p="http://schemas.openxmlformats.org/presentationml/2006/main">
+  <p:cSld>
+    <p:spTree>
+      <p:nvGrpSpPr>
+        <p:cNvPr id="1" name=""/>
+        <p:cNvGrpSpPr/>
+        <p:nvPr/>
+      </p:nvGrpSpPr>
+      <p:grpSpPr>
+        <a:xfrm>
+          <a:off x="0" y="0"/>
+          <a:ext cx="0" cy="0"/>
+          <a:chOff x="0" y="0"/>
+          <a:chExt cx="0" cy="0"/>
+        </a:xfrm>
+      </p:grpSpPr>
+      <p:pic>
+        <p:nvPicPr>
+          <p:cNvPr id="4" name="Picture 3"/>
+          <p:cNvPicPr>
+            <a:picLocks noChangeAspect="1"/>
+          </p:cNvPicPr>
           <p:nvPr/>
-        </p:nvCxnSpPr>
+        </p:nvPicPr>
+        <p:blipFill>
+          <a:blip r:embed="rId2">
+            <a:extLst>
+              <a:ext uri="{28A0092B-C50C-407E-A947-70E740481C1C}">
+                <a14:useLocalDpi xmlns:a14="http://schemas.microsoft.com/office/drawing/2010/main" val="0"/>
+              </a:ext>
+            </a:extLst>
+          </a:blip>
+          <a:stretch>
+            <a:fillRect/>
+          </a:stretch>
+        </p:blipFill>
         <p:spPr>
-          <a:xfrm flipV="1">
-            <a:off x="8719268" y="3486676"/>
-            <a:ext cx="20894" cy="2697480"/>
+          <a:xfrm>
+            <a:off x="2267261" y="1539407"/>
+            <a:ext cx="2590800" cy="3149600"/>
           </a:xfrm>
-          <a:prstGeom prst="line">
+          <a:prstGeom prst="rect">
             <a:avLst/>
           </a:prstGeom>
-          <a:ln w="25400">
-            <a:solidFill>
-              <a:srgbClr val="FF0000"/>
-            </a:solidFill>
-          </a:ln>
+        </p:spPr>
+      </p:pic>
+      <p:sp>
+        <p:nvSpPr>
+          <p:cNvPr id="5" name="TextBox 4"/>
+          <p:cNvSpPr txBox="1"/>
+          <p:nvPr/>
+        </p:nvSpPr>
+        <p:spPr>
+          <a:xfrm>
+            <a:off x="5360343" y="1761162"/>
+            <a:ext cx="5301451" cy="646331"/>
+          </a:xfrm>
+          <a:prstGeom prst="rect">
+            <a:avLst/>
+          </a:prstGeom>
+          <a:solidFill>
+            <a:srgbClr val="00B050"/>
+          </a:solidFill>
+        </p:spPr>
+        <p:txBody>
+          <a:bodyPr wrap="none" rtlCol="0">
+            <a:spAutoFit/>
+          </a:bodyPr>
+          <a:lstStyle/>
+          <a:p>
+            <a:r>
+              <a:rPr lang="en-US" sz="3600" b="1" dirty="0" smtClean="0">
+                <a:latin typeface="Times New Roman" charset="0"/>
+                <a:ea typeface="Times New Roman" charset="0"/>
+                <a:cs typeface="Times New Roman" charset="0"/>
+              </a:rPr>
+              <a:t>Case of Lopsided Outliers</a:t>
+            </a:r>
+            <a:endParaRPr lang="en-US" sz="3600" b="1" dirty="0">
+              <a:latin typeface="Times New Roman" charset="0"/>
+              <a:ea typeface="Times New Roman" charset="0"/>
+              <a:cs typeface="Times New Roman" charset="0"/>
+            </a:endParaRPr>
+          </a:p>
+        </p:txBody>
+      </p:sp>
+      <p:sp>
+        <p:nvSpPr>
+          <p:cNvPr id="6" name="TextBox 5"/>
+          <p:cNvSpPr txBox="1"/>
+          <p:nvPr/>
+        </p:nvSpPr>
+        <p:spPr>
+          <a:xfrm>
+            <a:off x="5360343" y="3599029"/>
+            <a:ext cx="5301451" cy="923330"/>
+          </a:xfrm>
+          <a:prstGeom prst="rect">
+            <a:avLst/>
+          </a:prstGeom>
+          <a:solidFill>
+            <a:srgbClr val="00B050">
+              <a:alpha val="70000"/>
+            </a:srgbClr>
+          </a:solidFill>
+        </p:spPr>
+        <p:txBody>
+          <a:bodyPr wrap="square" rtlCol="0">
+            <a:spAutoFit/>
+          </a:bodyPr>
+          <a:lstStyle/>
+          <a:p>
+            <a:r>
+              <a:rPr lang="en-US" dirty="0"/>
+              <a:t>Robinson, M.D. and Oshlack, A. (2010) A scaling normalization method for differential expression analysis of RNA-</a:t>
+            </a:r>
+            <a:r>
+              <a:rPr lang="en-US" dirty="0"/>
+              <a:t>seq</a:t>
+            </a:r>
+            <a:r>
+              <a:rPr lang="en-US" dirty="0"/>
+              <a:t> data. </a:t>
+            </a:r>
+            <a:r>
+              <a:rPr lang="en-US" i="1" dirty="0"/>
+              <a:t>Genome Biology</a:t>
+            </a:r>
+            <a:r>
+              <a:rPr lang="en-US" dirty="0"/>
+              <a:t>, 11, R25</a:t>
+            </a:r>
+          </a:p>
+        </p:txBody>
+      </p:sp>
+      <p:sp>
+        <p:nvSpPr>
+          <p:cNvPr id="8" name="Rectangle 7"/>
+          <p:cNvSpPr/>
+          <p:nvPr/>
+        </p:nvSpPr>
+        <p:spPr>
+          <a:xfrm>
+            <a:off x="2098623" y="1199213"/>
+            <a:ext cx="9114020" cy="3972394"/>
+          </a:xfrm>
+          <a:prstGeom prst="rect">
+            <a:avLst/>
+          </a:prstGeom>
+          <a:noFill/>
         </p:spPr>
         <p:style>
-          <a:lnRef idx="1">
-            <a:schemeClr val="accent1"/>
+          <a:lnRef idx="2">
+            <a:schemeClr val="accent1">
+              <a:shade val="50000"/>
+            </a:schemeClr>
           </a:lnRef>
-          <a:fillRef idx="0">
+          <a:fillRef idx="1">
             <a:schemeClr val="accent1"/>
           </a:fillRef>
           <a:effectRef idx="0">
             <a:schemeClr val="accent1"/>
           </a:effectRef>
           <a:fontRef idx="minor">
-            <a:schemeClr val="tx1"/>
+            <a:schemeClr val="lt1"/>
           </a:fontRef>
         </p:style>
-      </p:cxnSp>
+        <p:txBody>
+          <a:bodyPr rtlCol="0" anchor="ctr"/>
+          <a:lstStyle/>
+          <a:p>
+            <a:pPr algn="ctr"/>
+            <a:endParaRPr lang="en-US" dirty="0"/>
+          </a:p>
+        </p:txBody>
+      </p:sp>
     </p:spTree>
     <p:extLst>
       <p:ext uri="{BB962C8B-B14F-4D97-AF65-F5344CB8AC3E}">
-        <p14:creationId xmlns:p14="http://schemas.microsoft.com/office/powerpoint/2010/main" val="257336582"/>
+        <p14:creationId xmlns:p14="http://schemas.microsoft.com/office/powerpoint/2010/main" val="929178313"/>
       </p:ext>
     </p:extLst>
   </p:cSld>
@@ -3852,4 +5611,265 @@
     </a:ext>
   </a:extLst>
 </a:theme>
+</file>
+
+<file path=ppt/theme/theme2.xml><?xml version="1.0" encoding="utf-8"?>
+<a:theme xmlns:a="http://schemas.openxmlformats.org/drawingml/2006/main" name="Office Theme">
+  <a:themeElements>
+    <a:clrScheme name="Office">
+      <a:dk1>
+        <a:sysClr val="windowText" lastClr="000000"/>
+      </a:dk1>
+      <a:lt1>
+        <a:sysClr val="window" lastClr="FFFFFF"/>
+      </a:lt1>
+      <a:dk2>
+        <a:srgbClr val="44546A"/>
+      </a:dk2>
+      <a:lt2>
+        <a:srgbClr val="E7E6E6"/>
+      </a:lt2>
+      <a:accent1>
+        <a:srgbClr val="4472C4"/>
+      </a:accent1>
+      <a:accent2>
+        <a:srgbClr val="ED7D31"/>
+      </a:accent2>
+      <a:accent3>
+        <a:srgbClr val="A5A5A5"/>
+      </a:accent3>
+      <a:accent4>
+        <a:srgbClr val="FFC000"/>
+      </a:accent4>
+      <a:accent5>
+        <a:srgbClr val="5B9BD5"/>
+      </a:accent5>
+      <a:accent6>
+        <a:srgbClr val="70AD47"/>
+      </a:accent6>
+      <a:hlink>
+        <a:srgbClr val="0563C1"/>
+      </a:hlink>
+      <a:folHlink>
+        <a:srgbClr val="954F72"/>
+      </a:folHlink>
+    </a:clrScheme>
+    <a:fontScheme name="Office">
+      <a:majorFont>
+        <a:latin typeface="Calibri Light" panose="020F0302020204030204"/>
+        <a:ea typeface=""/>
+        <a:cs typeface=""/>
+        <a:font script="Jpan" typeface="Yu Gothic Light"/>
+        <a:font script="Hang" typeface="맑은 고딕"/>
+        <a:font script="Hans" typeface="DengXian Light"/>
+        <a:font script="Hant" typeface="新細明體"/>
+        <a:font script="Arab" typeface="Times New Roman"/>
+        <a:font script="Hebr" typeface="Times New Roman"/>
+        <a:font script="Thai" typeface="Angsana New"/>
+        <a:font script="Ethi" typeface="Nyala"/>
+        <a:font script="Beng" typeface="Vrinda"/>
+        <a:font script="Gujr" typeface="Shruti"/>
+        <a:font script="Khmr" typeface="MoolBoran"/>
+        <a:font script="Knda" typeface="Tunga"/>
+        <a:font script="Guru" typeface="Raavi"/>
+        <a:font script="Cans" typeface="Euphemia"/>
+        <a:font script="Cher" typeface="Plantagenet Cherokee"/>
+        <a:font script="Yiii" typeface="Microsoft Yi Baiti"/>
+        <a:font script="Tibt" typeface="Microsoft Himalaya"/>
+        <a:font script="Thaa" typeface="MV Boli"/>
+        <a:font script="Deva" typeface="Mangal"/>
+        <a:font script="Telu" typeface="Gautami"/>
+        <a:font script="Taml" typeface="Latha"/>
+        <a:font script="Syrc" typeface="Estrangelo Edessa"/>
+        <a:font script="Orya" typeface="Kalinga"/>
+        <a:font script="Mlym" typeface="Kartika"/>
+        <a:font script="Laoo" typeface="DokChampa"/>
+        <a:font script="Sinh" typeface="Iskoola Pota"/>
+        <a:font script="Mong" typeface="Mongolian Baiti"/>
+        <a:font script="Viet" typeface="Times New Roman"/>
+        <a:font script="Uigh" typeface="Microsoft Uighur"/>
+        <a:font script="Geor" typeface="Sylfaen"/>
+      </a:majorFont>
+      <a:minorFont>
+        <a:latin typeface="Calibri" panose="020F0502020204030204"/>
+        <a:ea typeface=""/>
+        <a:cs typeface=""/>
+        <a:font script="Jpan" typeface="Yu Gothic"/>
+        <a:font script="Hang" typeface="맑은 고딕"/>
+        <a:font script="Hans" typeface="DengXian"/>
+        <a:font script="Hant" typeface="新細明體"/>
+        <a:font script="Arab" typeface="Arial"/>
+        <a:font script="Hebr" typeface="Arial"/>
+        <a:font script="Thai" typeface="Cordia New"/>
+        <a:font script="Ethi" typeface="Nyala"/>
+        <a:font script="Beng" typeface="Vrinda"/>
+        <a:font script="Gujr" typeface="Shruti"/>
+        <a:font script="Khmr" typeface="DaunPenh"/>
+        <a:font script="Knda" typeface="Tunga"/>
+        <a:font script="Guru" typeface="Raavi"/>
+        <a:font script="Cans" typeface="Euphemia"/>
+        <a:font script="Cher" typeface="Plantagenet Cherokee"/>
+        <a:font script="Yiii" typeface="Microsoft Yi Baiti"/>
+        <a:font script="Tibt" typeface="Microsoft Himalaya"/>
+        <a:font script="Thaa" typeface="MV Boli"/>
+        <a:font script="Deva" typeface="Mangal"/>
+        <a:font script="Telu" typeface="Gautami"/>
+        <a:font script="Taml" typeface="Latha"/>
+        <a:font script="Syrc" typeface="Estrangelo Edessa"/>
+        <a:font script="Orya" typeface="Kalinga"/>
+        <a:font script="Mlym" typeface="Kartika"/>
+        <a:font script="Laoo" typeface="DokChampa"/>
+        <a:font script="Sinh" typeface="Iskoola Pota"/>
+        <a:font script="Mong" typeface="Mongolian Baiti"/>
+        <a:font script="Viet" typeface="Arial"/>
+        <a:font script="Uigh" typeface="Microsoft Uighur"/>
+        <a:font script="Geor" typeface="Sylfaen"/>
+      </a:minorFont>
+    </a:fontScheme>
+    <a:fmtScheme name="Office">
+      <a:fillStyleLst>
+        <a:solidFill>
+          <a:schemeClr val="phClr"/>
+        </a:solidFill>
+        <a:gradFill rotWithShape="1">
+          <a:gsLst>
+            <a:gs pos="0">
+              <a:schemeClr val="phClr">
+                <a:lumMod val="110000"/>
+                <a:satMod val="105000"/>
+                <a:tint val="67000"/>
+              </a:schemeClr>
+            </a:gs>
+            <a:gs pos="50000">
+              <a:schemeClr val="phClr">
+                <a:lumMod val="105000"/>
+                <a:satMod val="103000"/>
+                <a:tint val="73000"/>
+              </a:schemeClr>
+            </a:gs>
+            <a:gs pos="100000">
+              <a:schemeClr val="phClr">
+                <a:lumMod val="105000"/>
+                <a:satMod val="109000"/>
+                <a:tint val="81000"/>
+              </a:schemeClr>
+            </a:gs>
+          </a:gsLst>
+          <a:lin ang="5400000" scaled="0"/>
+        </a:gradFill>
+        <a:gradFill rotWithShape="1">
+          <a:gsLst>
+            <a:gs pos="0">
+              <a:schemeClr val="phClr">
+                <a:satMod val="103000"/>
+                <a:lumMod val="102000"/>
+                <a:tint val="94000"/>
+              </a:schemeClr>
+            </a:gs>
+            <a:gs pos="50000">
+              <a:schemeClr val="phClr">
+                <a:satMod val="110000"/>
+                <a:lumMod val="100000"/>
+                <a:shade val="100000"/>
+              </a:schemeClr>
+            </a:gs>
+            <a:gs pos="100000">
+              <a:schemeClr val="phClr">
+                <a:lumMod val="99000"/>
+                <a:satMod val="120000"/>
+                <a:shade val="78000"/>
+              </a:schemeClr>
+            </a:gs>
+          </a:gsLst>
+          <a:lin ang="5400000" scaled="0"/>
+        </a:gradFill>
+      </a:fillStyleLst>
+      <a:lnStyleLst>
+        <a:ln w="6350" cap="flat" cmpd="sng" algn="ctr">
+          <a:solidFill>
+            <a:schemeClr val="phClr"/>
+          </a:solidFill>
+          <a:prstDash val="solid"/>
+          <a:miter lim="800000"/>
+        </a:ln>
+        <a:ln w="12700" cap="flat" cmpd="sng" algn="ctr">
+          <a:solidFill>
+            <a:schemeClr val="phClr"/>
+          </a:solidFill>
+          <a:prstDash val="solid"/>
+          <a:miter lim="800000"/>
+        </a:ln>
+        <a:ln w="19050" cap="flat" cmpd="sng" algn="ctr">
+          <a:solidFill>
+            <a:schemeClr val="phClr"/>
+          </a:solidFill>
+          <a:prstDash val="solid"/>
+          <a:miter lim="800000"/>
+        </a:ln>
+      </a:lnStyleLst>
+      <a:effectStyleLst>
+        <a:effectStyle>
+          <a:effectLst/>
+        </a:effectStyle>
+        <a:effectStyle>
+          <a:effectLst/>
+        </a:effectStyle>
+        <a:effectStyle>
+          <a:effectLst>
+            <a:outerShdw blurRad="57150" dist="19050" dir="5400000" algn="ctr" rotWithShape="0">
+              <a:srgbClr val="000000">
+                <a:alpha val="63000"/>
+              </a:srgbClr>
+            </a:outerShdw>
+          </a:effectLst>
+        </a:effectStyle>
+      </a:effectStyleLst>
+      <a:bgFillStyleLst>
+        <a:solidFill>
+          <a:schemeClr val="phClr"/>
+        </a:solidFill>
+        <a:solidFill>
+          <a:schemeClr val="phClr">
+            <a:tint val="95000"/>
+            <a:satMod val="170000"/>
+          </a:schemeClr>
+        </a:solidFill>
+        <a:gradFill rotWithShape="1">
+          <a:gsLst>
+            <a:gs pos="0">
+              <a:schemeClr val="phClr">
+                <a:tint val="93000"/>
+                <a:satMod val="150000"/>
+                <a:shade val="98000"/>
+                <a:lumMod val="102000"/>
+              </a:schemeClr>
+            </a:gs>
+            <a:gs pos="50000">
+              <a:schemeClr val="phClr">
+                <a:tint val="98000"/>
+                <a:satMod val="130000"/>
+                <a:shade val="90000"/>
+                <a:lumMod val="103000"/>
+              </a:schemeClr>
+            </a:gs>
+            <a:gs pos="100000">
+              <a:schemeClr val="phClr">
+                <a:shade val="63000"/>
+                <a:satMod val="120000"/>
+              </a:schemeClr>
+            </a:gs>
+          </a:gsLst>
+          <a:lin ang="5400000" scaled="0"/>
+        </a:gradFill>
+      </a:bgFillStyleLst>
+    </a:fmtScheme>
+  </a:themeElements>
+  <a:objectDefaults/>
+  <a:extraClrSchemeLst/>
+  <a:extLst>
+    <a:ext uri="{05A4C25C-085E-4340-85A3-A5531E510DB2}">
+      <thm15:themeFamily xmlns:thm15="http://schemas.microsoft.com/office/thememl/2012/main" name="Office Theme" id="{62F939B6-93AF-4DB8-9C6B-D6C7DFDC589F}" vid="{4A3C46E8-61CC-4603-A589-7422A47A8E4A}"/>
+    </a:ext>
+  </a:extLst>
+</a:theme>
 </file>
</xml_diff>